<commit_message>
Wrapped figure in text. Modified equations to make it more readable.
</commit_message>
<xml_diff>
--- a/2018_nips_vigil/img/mac_cell.pptx
+++ b/2018_nips_vigil/img/mac_cell.pptx
@@ -104,6 +104,11 @@
       </a:defRPr>
     </a:lvl9pPr>
   </p:defaultTextStyle>
+  <p:extLst>
+    <p:ext uri="{EFAFB233-063F-42B5-8137-9DF3F51BA10A}">
+      <p15:sldGuideLst xmlns:p15="http://schemas.microsoft.com/office/powerpoint/2012/main"/>
+    </p:ext>
+  </p:extLst>
 </p:presentation>
 </file>
 
@@ -254,7 +259,7 @@
           <a:p>
             <a:fld id="{53E7DE36-4596-454C-B21C-42E50E8107FF}" type="datetimeFigureOut">
               <a:rPr lang="en-US" smtClean="0"/>
-              <a:t>10/25/18</a:t>
+              <a:t>10/29/18</a:t>
             </a:fld>
             <a:endParaRPr lang="en-US"/>
           </a:p>
@@ -452,7 +457,7 @@
           <a:p>
             <a:fld id="{53E7DE36-4596-454C-B21C-42E50E8107FF}" type="datetimeFigureOut">
               <a:rPr lang="en-US" smtClean="0"/>
-              <a:t>10/25/18</a:t>
+              <a:t>10/29/18</a:t>
             </a:fld>
             <a:endParaRPr lang="en-US"/>
           </a:p>
@@ -660,7 +665,7 @@
           <a:p>
             <a:fld id="{53E7DE36-4596-454C-B21C-42E50E8107FF}" type="datetimeFigureOut">
               <a:rPr lang="en-US" smtClean="0"/>
-              <a:t>10/25/18</a:t>
+              <a:t>10/29/18</a:t>
             </a:fld>
             <a:endParaRPr lang="en-US"/>
           </a:p>
@@ -858,7 +863,7 @@
           <a:p>
             <a:fld id="{53E7DE36-4596-454C-B21C-42E50E8107FF}" type="datetimeFigureOut">
               <a:rPr lang="en-US" smtClean="0"/>
-              <a:t>10/25/18</a:t>
+              <a:t>10/29/18</a:t>
             </a:fld>
             <a:endParaRPr lang="en-US"/>
           </a:p>
@@ -1133,7 +1138,7 @@
           <a:p>
             <a:fld id="{53E7DE36-4596-454C-B21C-42E50E8107FF}" type="datetimeFigureOut">
               <a:rPr lang="en-US" smtClean="0"/>
-              <a:t>10/25/18</a:t>
+              <a:t>10/29/18</a:t>
             </a:fld>
             <a:endParaRPr lang="en-US"/>
           </a:p>
@@ -1398,7 +1403,7 @@
           <a:p>
             <a:fld id="{53E7DE36-4596-454C-B21C-42E50E8107FF}" type="datetimeFigureOut">
               <a:rPr lang="en-US" smtClean="0"/>
-              <a:t>10/25/18</a:t>
+              <a:t>10/29/18</a:t>
             </a:fld>
             <a:endParaRPr lang="en-US"/>
           </a:p>
@@ -1810,7 +1815,7 @@
           <a:p>
             <a:fld id="{53E7DE36-4596-454C-B21C-42E50E8107FF}" type="datetimeFigureOut">
               <a:rPr lang="en-US" smtClean="0"/>
-              <a:t>10/25/18</a:t>
+              <a:t>10/29/18</a:t>
             </a:fld>
             <a:endParaRPr lang="en-US"/>
           </a:p>
@@ -1951,7 +1956,7 @@
           <a:p>
             <a:fld id="{53E7DE36-4596-454C-B21C-42E50E8107FF}" type="datetimeFigureOut">
               <a:rPr lang="en-US" smtClean="0"/>
-              <a:t>10/25/18</a:t>
+              <a:t>10/29/18</a:t>
             </a:fld>
             <a:endParaRPr lang="en-US"/>
           </a:p>
@@ -2064,7 +2069,7 @@
           <a:p>
             <a:fld id="{53E7DE36-4596-454C-B21C-42E50E8107FF}" type="datetimeFigureOut">
               <a:rPr lang="en-US" smtClean="0"/>
-              <a:t>10/25/18</a:t>
+              <a:t>10/29/18</a:t>
             </a:fld>
             <a:endParaRPr lang="en-US"/>
           </a:p>
@@ -2375,7 +2380,7 @@
           <a:p>
             <a:fld id="{53E7DE36-4596-454C-B21C-42E50E8107FF}" type="datetimeFigureOut">
               <a:rPr lang="en-US" smtClean="0"/>
-              <a:t>10/25/18</a:t>
+              <a:t>10/29/18</a:t>
             </a:fld>
             <a:endParaRPr lang="en-US"/>
           </a:p>
@@ -2663,7 +2668,7 @@
           <a:p>
             <a:fld id="{53E7DE36-4596-454C-B21C-42E50E8107FF}" type="datetimeFigureOut">
               <a:rPr lang="en-US" smtClean="0"/>
-              <a:t>10/25/18</a:t>
+              <a:t>10/29/18</a:t>
             </a:fld>
             <a:endParaRPr lang="en-US"/>
           </a:p>
@@ -2904,7 +2909,7 @@
           <a:p>
             <a:fld id="{53E7DE36-4596-454C-B21C-42E50E8107FF}" type="datetimeFigureOut">
               <a:rPr lang="en-US" smtClean="0"/>
-              <a:t>10/25/18</a:t>
+              <a:t>10/29/18</a:t>
             </a:fld>
             <a:endParaRPr lang="en-US"/>
           </a:p>
@@ -3370,12 +3375,12 @@
           <a:p>
             <a:pPr algn="ctr"/>
             <a:r>
-              <a:rPr lang="en-US" dirty="0">
+              <a:rPr lang="en-US" sz="2400" dirty="0">
                 <a:solidFill>
                   <a:schemeClr val="tx1"/>
                 </a:solidFill>
               </a:rPr>
-              <a:t>Control Unit</a:t>
+              <a:t>Control</a:t>
             </a:r>
           </a:p>
         </p:txBody>
@@ -3429,12 +3434,12 @@
           <a:p>
             <a:pPr algn="ctr"/>
             <a:r>
-              <a:rPr lang="en-US" dirty="0">
+              <a:rPr lang="en-US" sz="2400" dirty="0">
                 <a:solidFill>
                   <a:schemeClr val="tx1"/>
                 </a:solidFill>
               </a:rPr>
-              <a:t>Read Unit</a:t>
+              <a:t>Read</a:t>
             </a:r>
           </a:p>
         </p:txBody>
@@ -3486,12 +3491,12 @@
           <a:p>
             <a:pPr algn="ctr"/>
             <a:r>
-              <a:rPr lang="en-US" dirty="0">
+              <a:rPr lang="en-US" sz="2400" dirty="0">
                 <a:solidFill>
                   <a:schemeClr val="tx1"/>
                 </a:solidFill>
               </a:rPr>
-              <a:t>Write Unit</a:t>
+              <a:t>Write</a:t>
             </a:r>
           </a:p>
         </p:txBody>
@@ -3562,8 +3567,8 @@
             </p:nvSpPr>
             <p:spPr>
               <a:xfrm>
-                <a:off x="4309833" y="2048011"/>
-                <a:ext cx="365760" cy="365760"/>
+                <a:off x="4309833" y="2165700"/>
+                <a:ext cx="457200" cy="457200"/>
               </a:xfrm>
               <a:prstGeom prst="ellipse">
                 <a:avLst/>
@@ -3605,32 +3610,35 @@
                       <m:sSub>
                         <m:sSubPr>
                           <m:ctrlPr>
-                            <a:rPr lang="en-US" b="0" i="1" smtClean="0">
+                            <a:rPr lang="en-US" sz="2400" b="0" i="1" smtClean="0">
                               <a:solidFill>
                                 <a:schemeClr val="tx1"/>
                               </a:solidFill>
                               <a:latin typeface="Cambria Math" panose="02040503050406030204" pitchFamily="18" charset="0"/>
+                              <a:ea typeface="Cambria Math" panose="02040503050406030204" pitchFamily="18" charset="0"/>
                             </a:rPr>
                           </m:ctrlPr>
                         </m:sSubPr>
                         <m:e>
                           <m:r>
-                            <a:rPr lang="en-US" b="0" i="1" smtClean="0">
+                            <a:rPr lang="en-US" sz="2400" b="0" i="1" smtClean="0">
                               <a:solidFill>
                                 <a:schemeClr val="tx1"/>
                               </a:solidFill>
                               <a:latin typeface="Cambria Math" panose="02040503050406030204" pitchFamily="18" charset="0"/>
+                              <a:ea typeface="Cambria Math" panose="02040503050406030204" pitchFamily="18" charset="0"/>
                             </a:rPr>
                             <m:t>𝑐</m:t>
                           </m:r>
                         </m:e>
                         <m:sub>
                           <m:r>
-                            <a:rPr lang="en-US" b="0" i="1" smtClean="0">
+                            <a:rPr lang="en-US" sz="2400" b="0" i="1" smtClean="0">
                               <a:solidFill>
                                 <a:schemeClr val="tx1"/>
                               </a:solidFill>
                               <a:latin typeface="Cambria Math" panose="02040503050406030204" pitchFamily="18" charset="0"/>
+                              <a:ea typeface="Cambria Math" panose="02040503050406030204" pitchFamily="18" charset="0"/>
                             </a:rPr>
                             <m:t>𝑖</m:t>
                           </m:r>
@@ -3639,10 +3647,12 @@
                     </m:oMath>
                   </m:oMathPara>
                 </a14:m>
-                <a:endParaRPr lang="en-US" dirty="0">
+                <a:endParaRPr lang="en-US" sz="2400" dirty="0">
                   <a:solidFill>
                     <a:schemeClr val="tx1"/>
                   </a:solidFill>
+                  <a:latin typeface="Cambria Math" panose="02040503050406030204" pitchFamily="18" charset="0"/>
+                  <a:ea typeface="Cambria Math" panose="02040503050406030204" pitchFamily="18" charset="0"/>
                 </a:endParaRPr>
               </a:p>
             </p:txBody>
@@ -3665,8 +3675,8 @@
             </p:nvSpPr>
             <p:spPr>
               <a:xfrm>
-                <a:off x="4309833" y="2048011"/>
-                <a:ext cx="365760" cy="365760"/>
+                <a:off x="4309833" y="2165700"/>
+                <a:ext cx="457200" cy="457200"/>
               </a:xfrm>
               <a:prstGeom prst="ellipse">
                 <a:avLst/>
@@ -3709,8 +3719,8 @@
         </p:nvCxnSpPr>
         <p:spPr>
           <a:xfrm>
-            <a:off x="844759" y="1752307"/>
-            <a:ext cx="2919307" cy="0"/>
+            <a:off x="1257300" y="1752307"/>
+            <a:ext cx="2506766" cy="0"/>
           </a:xfrm>
           <a:prstGeom prst="straightConnector1">
             <a:avLst/>
@@ -3804,8 +3814,8 @@
         </p:nvCxnSpPr>
         <p:spPr>
           <a:xfrm>
-            <a:off x="4675593" y="2230891"/>
-            <a:ext cx="978594" cy="1198109"/>
+            <a:off x="4767033" y="2394300"/>
+            <a:ext cx="887154" cy="1034700"/>
           </a:xfrm>
           <a:prstGeom prst="bentConnector2">
             <a:avLst/>
@@ -3851,8 +3861,8 @@
         </p:nvCxnSpPr>
         <p:spPr>
           <a:xfrm rot="10800000" flipV="1">
-            <a:off x="3331241" y="2230890"/>
-            <a:ext cx="978592" cy="1198109"/>
+            <a:off x="3331241" y="2394300"/>
+            <a:ext cx="978592" cy="1034700"/>
           </a:xfrm>
           <a:prstGeom prst="bentConnector2">
             <a:avLst/>
@@ -3897,12 +3907,12 @@
         </p:nvCxnSpPr>
         <p:spPr>
           <a:xfrm flipV="1">
-            <a:off x="5164890" y="1705389"/>
-            <a:ext cx="3164716" cy="522156"/>
+            <a:off x="5654186" y="1746814"/>
+            <a:ext cx="2123354" cy="647486"/>
           </a:xfrm>
           <a:prstGeom prst="bentConnector3">
             <a:avLst>
-              <a:gd name="adj1" fmla="val 1939"/>
+              <a:gd name="adj1" fmla="val 50000"/>
             </a:avLst>
           </a:prstGeom>
           <a:ln w="19050" cap="flat">
@@ -3941,14 +3951,13 @@
           </p:cNvPr>
           <p:cNvCxnSpPr>
             <a:cxnSpLocks/>
-            <a:endCxn id="6" idx="1"/>
           </p:cNvCxnSpPr>
           <p:nvPr/>
         </p:nvCxnSpPr>
         <p:spPr>
           <a:xfrm>
-            <a:off x="905347" y="4057650"/>
-            <a:ext cx="1638982" cy="0"/>
+            <a:off x="1257300" y="4057650"/>
+            <a:ext cx="1287029" cy="0"/>
           </a:xfrm>
           <a:prstGeom prst="straightConnector1">
             <a:avLst/>
@@ -4001,7 +4010,7 @@
               <a:gd name="adj1" fmla="val 61541"/>
             </a:avLst>
           </a:prstGeom>
-          <a:ln w="22225">
+          <a:ln w="19050">
             <a:solidFill>
               <a:schemeClr val="accent1">
                 <a:lumMod val="75000"/>
@@ -4041,15 +4050,15 @@
         </p:nvCxnSpPr>
         <p:spPr>
           <a:xfrm>
-            <a:off x="1439501" y="4057650"/>
-            <a:ext cx="1787947" cy="1048042"/>
+            <a:off x="1890346" y="4057650"/>
+            <a:ext cx="1353076" cy="1048042"/>
           </a:xfrm>
           <a:prstGeom prst="bentConnector3">
             <a:avLst>
-              <a:gd name="adj1" fmla="val 38354"/>
+              <a:gd name="adj1" fmla="val 615"/>
             </a:avLst>
           </a:prstGeom>
-          <a:ln w="22225">
+          <a:ln w="19050">
             <a:solidFill>
               <a:schemeClr val="accent1">
                 <a:lumMod val="75000"/>
@@ -4089,8 +4098,8 @@
             </p:nvSpPr>
             <p:spPr>
               <a:xfrm>
-                <a:off x="363505" y="1520723"/>
-                <a:ext cx="560473" cy="369332"/>
+                <a:off x="774851" y="1544536"/>
+                <a:ext cx="682046" cy="461665"/>
               </a:xfrm>
               <a:prstGeom prst="rect">
                 <a:avLst/>
@@ -4103,6 +4112,7 @@
               </a:bodyPr>
               <a:lstStyle/>
               <a:p>
+                <a:pPr/>
                 <a14:m>
                   <m:oMathPara xmlns:m="http://schemas.openxmlformats.org/officeDocument/2006/math">
                     <m:oMathParaPr>
@@ -4112,32 +4122,35 @@
                       <m:sSub>
                         <m:sSubPr>
                           <m:ctrlPr>
-                            <a:rPr lang="en-US" b="0" i="1" smtClean="0">
+                            <a:rPr lang="en-US" sz="2400" b="0" i="1" smtClean="0">
                               <a:solidFill>
                                 <a:schemeClr val="tx1"/>
                               </a:solidFill>
                               <a:latin typeface="Cambria Math" panose="02040503050406030204" pitchFamily="18" charset="0"/>
+                              <a:ea typeface="Cambria Math" panose="02040503050406030204" pitchFamily="18" charset="0"/>
                             </a:rPr>
                           </m:ctrlPr>
                         </m:sSubPr>
                         <m:e>
                           <m:r>
-                            <a:rPr lang="en-US" b="0" i="1" smtClean="0">
+                            <a:rPr lang="en-US" sz="2400" b="0" i="1" smtClean="0">
                               <a:solidFill>
                                 <a:schemeClr val="tx1"/>
                               </a:solidFill>
                               <a:latin typeface="Cambria Math" panose="02040503050406030204" pitchFamily="18" charset="0"/>
+                              <a:ea typeface="Cambria Math" panose="02040503050406030204" pitchFamily="18" charset="0"/>
                             </a:rPr>
                             <m:t>𝑐</m:t>
                           </m:r>
                         </m:e>
                         <m:sub>
                           <m:r>
-                            <a:rPr lang="en-US" b="0" i="1" smtClean="0">
+                            <a:rPr lang="en-US" sz="2400" b="0" i="1" smtClean="0">
                               <a:solidFill>
                                 <a:schemeClr val="tx1"/>
                               </a:solidFill>
                               <a:latin typeface="Cambria Math" panose="02040503050406030204" pitchFamily="18" charset="0"/>
+                              <a:ea typeface="Cambria Math" panose="02040503050406030204" pitchFamily="18" charset="0"/>
                             </a:rPr>
                             <m:t>𝑖</m:t>
                           </m:r>
@@ -4145,20 +4158,22 @@
                             <m:rPr>
                               <m:nor/>
                             </m:rPr>
-                            <a:rPr lang="en-US" b="0" i="0" smtClean="0">
+                            <a:rPr lang="en-US" sz="2400" b="0" i="0" smtClean="0">
                               <a:solidFill>
                                 <a:schemeClr val="tx1"/>
                               </a:solidFill>
                               <a:latin typeface="Cambria Math" panose="02040503050406030204" pitchFamily="18" charset="0"/>
+                              <a:ea typeface="Cambria Math" panose="02040503050406030204" pitchFamily="18" charset="0"/>
                             </a:rPr>
                             <m:t>-</m:t>
                           </m:r>
                           <m:r>
-                            <a:rPr lang="en-US" b="0" i="1" smtClean="0">
+                            <a:rPr lang="en-US" sz="2400" b="0" i="1" smtClean="0">
                               <a:solidFill>
                                 <a:schemeClr val="tx1"/>
                               </a:solidFill>
                               <a:latin typeface="Cambria Math" panose="02040503050406030204" pitchFamily="18" charset="0"/>
+                              <a:ea typeface="Cambria Math" panose="02040503050406030204" pitchFamily="18" charset="0"/>
                             </a:rPr>
                             <m:t>1</m:t>
                           </m:r>
@@ -4167,7 +4182,10 @@
                     </m:oMath>
                   </m:oMathPara>
                 </a14:m>
-                <a:endParaRPr lang="en-US" dirty="0"/>
+                <a:endParaRPr lang="en-US" sz="2400" dirty="0">
+                  <a:latin typeface="Cambria Math" panose="02040503050406030204" pitchFamily="18" charset="0"/>
+                  <a:ea typeface="Cambria Math" panose="02040503050406030204" pitchFamily="18" charset="0"/>
+                </a:endParaRPr>
               </a:p>
             </p:txBody>
           </p:sp>
@@ -4189,8 +4207,8 @@
             </p:nvSpPr>
             <p:spPr>
               <a:xfrm>
-                <a:off x="363505" y="1520723"/>
-                <a:ext cx="560473" cy="369332"/>
+                <a:off x="774851" y="1544536"/>
+                <a:ext cx="682046" cy="461665"/>
               </a:xfrm>
               <a:prstGeom prst="rect">
                 <a:avLst/>
@@ -4233,8 +4251,8 @@
             </p:nvSpPr>
             <p:spPr>
               <a:xfrm>
-                <a:off x="385193" y="3804284"/>
-                <a:ext cx="671915" cy="369332"/>
+                <a:off x="633393" y="3845825"/>
+                <a:ext cx="806567" cy="461665"/>
               </a:xfrm>
               <a:prstGeom prst="rect">
                 <a:avLst/>
@@ -4247,6 +4265,7 @@
               </a:bodyPr>
               <a:lstStyle/>
               <a:p>
+                <a:pPr/>
                 <a14:m>
                   <m:oMathPara xmlns:m="http://schemas.openxmlformats.org/officeDocument/2006/math">
                     <m:oMathParaPr>
@@ -4256,32 +4275,35 @@
                       <m:sSub>
                         <m:sSubPr>
                           <m:ctrlPr>
-                            <a:rPr lang="en-US" b="0" i="1" smtClean="0">
+                            <a:rPr lang="en-US" sz="2400" b="0" i="1" smtClean="0">
                               <a:solidFill>
                                 <a:schemeClr val="tx1"/>
                               </a:solidFill>
                               <a:latin typeface="Cambria Math" panose="02040503050406030204" pitchFamily="18" charset="0"/>
+                              <a:ea typeface="Cambria Math" panose="02040503050406030204" pitchFamily="18" charset="0"/>
                             </a:rPr>
                           </m:ctrlPr>
                         </m:sSubPr>
                         <m:e>
                           <m:r>
-                            <a:rPr lang="en-US" b="0" i="1" smtClean="0">
+                            <a:rPr lang="en-US" sz="2400" b="0" i="1" smtClean="0">
                               <a:solidFill>
                                 <a:schemeClr val="tx1"/>
                               </a:solidFill>
                               <a:latin typeface="Cambria Math" panose="02040503050406030204" pitchFamily="18" charset="0"/>
+                              <a:ea typeface="Cambria Math" panose="02040503050406030204" pitchFamily="18" charset="0"/>
                             </a:rPr>
                             <m:t>𝑚</m:t>
                           </m:r>
                         </m:e>
                         <m:sub>
                           <m:r>
-                            <a:rPr lang="en-US" b="0" i="1" smtClean="0">
+                            <a:rPr lang="en-US" sz="2400" b="0" i="1" smtClean="0">
                               <a:solidFill>
                                 <a:schemeClr val="tx1"/>
                               </a:solidFill>
                               <a:latin typeface="Cambria Math" panose="02040503050406030204" pitchFamily="18" charset="0"/>
+                              <a:ea typeface="Cambria Math" panose="02040503050406030204" pitchFamily="18" charset="0"/>
                             </a:rPr>
                             <m:t>𝑖</m:t>
                           </m:r>
@@ -4289,20 +4311,22 @@
                             <m:rPr>
                               <m:nor/>
                             </m:rPr>
-                            <a:rPr lang="en-US" b="0" i="0" smtClean="0">
+                            <a:rPr lang="en-US" sz="2400" b="0" i="0" smtClean="0">
                               <a:solidFill>
                                 <a:schemeClr val="tx1"/>
                               </a:solidFill>
                               <a:latin typeface="Cambria Math" panose="02040503050406030204" pitchFamily="18" charset="0"/>
+                              <a:ea typeface="Cambria Math" panose="02040503050406030204" pitchFamily="18" charset="0"/>
                             </a:rPr>
                             <m:t>-</m:t>
                           </m:r>
                           <m:r>
-                            <a:rPr lang="en-US" b="0" i="1" smtClean="0">
+                            <a:rPr lang="en-US" sz="2400" b="0" i="1" smtClean="0">
                               <a:solidFill>
                                 <a:schemeClr val="tx1"/>
                               </a:solidFill>
                               <a:latin typeface="Cambria Math" panose="02040503050406030204" pitchFamily="18" charset="0"/>
+                              <a:ea typeface="Cambria Math" panose="02040503050406030204" pitchFamily="18" charset="0"/>
                             </a:rPr>
                             <m:t>1</m:t>
                           </m:r>
@@ -4311,7 +4335,10 @@
                     </m:oMath>
                   </m:oMathPara>
                 </a14:m>
-                <a:endParaRPr lang="en-US" dirty="0"/>
+                <a:endParaRPr lang="en-US" sz="2400" dirty="0">
+                  <a:latin typeface="Cambria Math" panose="02040503050406030204" pitchFamily="18" charset="0"/>
+                  <a:ea typeface="Cambria Math" panose="02040503050406030204" pitchFamily="18" charset="0"/>
+                </a:endParaRPr>
               </a:p>
             </p:txBody>
           </p:sp>
@@ -4333,8 +4360,8 @@
             </p:nvSpPr>
             <p:spPr>
               <a:xfrm>
-                <a:off x="385193" y="3804284"/>
-                <a:ext cx="671915" cy="369332"/>
+                <a:off x="633393" y="3845825"/>
+                <a:ext cx="806567" cy="461665"/>
               </a:xfrm>
               <a:prstGeom prst="rect">
                 <a:avLst/>
@@ -4377,8 +4404,8 @@
             </p:nvSpPr>
             <p:spPr>
               <a:xfrm>
-                <a:off x="8248933" y="1517377"/>
-                <a:ext cx="412356" cy="369332"/>
+                <a:off x="7670945" y="1511423"/>
+                <a:ext cx="484556" cy="461665"/>
               </a:xfrm>
               <a:prstGeom prst="rect">
                 <a:avLst/>
@@ -4391,6 +4418,7 @@
               </a:bodyPr>
               <a:lstStyle/>
               <a:p>
+                <a:pPr/>
                 <a14:m>
                   <m:oMathPara xmlns:m="http://schemas.openxmlformats.org/officeDocument/2006/math">
                     <m:oMathParaPr>
@@ -4400,32 +4428,35 @@
                       <m:sSub>
                         <m:sSubPr>
                           <m:ctrlPr>
-                            <a:rPr lang="en-US" b="0" i="1" smtClean="0">
+                            <a:rPr lang="en-US" sz="2400" b="0" i="1" smtClean="0">
                               <a:solidFill>
                                 <a:schemeClr val="tx1"/>
                               </a:solidFill>
                               <a:latin typeface="Cambria Math" panose="02040503050406030204" pitchFamily="18" charset="0"/>
+                              <a:ea typeface="Cambria Math" panose="02040503050406030204" pitchFamily="18" charset="0"/>
                             </a:rPr>
                           </m:ctrlPr>
                         </m:sSubPr>
                         <m:e>
                           <m:r>
-                            <a:rPr lang="en-US" b="0" i="1" smtClean="0">
+                            <a:rPr lang="en-US" sz="2400" b="0" i="1" smtClean="0">
                               <a:solidFill>
                                 <a:schemeClr val="tx1"/>
                               </a:solidFill>
                               <a:latin typeface="Cambria Math" panose="02040503050406030204" pitchFamily="18" charset="0"/>
+                              <a:ea typeface="Cambria Math" panose="02040503050406030204" pitchFamily="18" charset="0"/>
                             </a:rPr>
                             <m:t>𝑐</m:t>
                           </m:r>
                         </m:e>
                         <m:sub>
                           <m:r>
-                            <a:rPr lang="en-US" b="0" i="1" smtClean="0">
+                            <a:rPr lang="en-US" sz="2400" b="0" i="1" smtClean="0">
                               <a:solidFill>
                                 <a:schemeClr val="tx1"/>
                               </a:solidFill>
                               <a:latin typeface="Cambria Math" panose="02040503050406030204" pitchFamily="18" charset="0"/>
+                              <a:ea typeface="Cambria Math" panose="02040503050406030204" pitchFamily="18" charset="0"/>
                             </a:rPr>
                             <m:t>𝑖</m:t>
                           </m:r>
@@ -4434,7 +4465,10 @@
                     </m:oMath>
                   </m:oMathPara>
                 </a14:m>
-                <a:endParaRPr lang="en-US" dirty="0"/>
+                <a:endParaRPr lang="en-US" sz="2400" dirty="0">
+                  <a:latin typeface="Cambria Math" panose="02040503050406030204" pitchFamily="18" charset="0"/>
+                  <a:ea typeface="Cambria Math" panose="02040503050406030204" pitchFamily="18" charset="0"/>
+                </a:endParaRPr>
               </a:p>
             </p:txBody>
           </p:sp>
@@ -4456,8 +4490,8 @@
             </p:nvSpPr>
             <p:spPr>
               <a:xfrm>
-                <a:off x="8248933" y="1517377"/>
-                <a:ext cx="412356" cy="369332"/>
+                <a:off x="7670945" y="1511423"/>
+                <a:ext cx="484556" cy="461665"/>
               </a:xfrm>
               <a:prstGeom prst="rect">
                 <a:avLst/>
@@ -4544,8 +4578,8 @@
         </p:nvSpPr>
         <p:spPr>
           <a:xfrm>
-            <a:off x="2089449" y="3376969"/>
-            <a:ext cx="429926" cy="369332"/>
+            <a:off x="2017025" y="3331704"/>
+            <a:ext cx="566181" cy="461665"/>
           </a:xfrm>
           <a:prstGeom prst="rect">
             <a:avLst/>
@@ -4559,7 +4593,10 @@
           <a:lstStyle/>
           <a:p>
             <a:r>
-              <a:rPr lang="en-US" dirty="0"/>
+              <a:rPr lang="en-US" sz="2400" dirty="0">
+                <a:latin typeface="Cambria Math" panose="02040503050406030204" pitchFamily="18" charset="0"/>
+                <a:ea typeface="Cambria Math" panose="02040503050406030204" pitchFamily="18" charset="0"/>
+              </a:rPr>
               <a:t>KB</a:t>
             </a:r>
           </a:p>
@@ -4581,8 +4618,8 @@
             </p:nvSpPr>
             <p:spPr>
               <a:xfrm>
-                <a:off x="4190694" y="3688318"/>
-                <a:ext cx="395814" cy="369332"/>
+                <a:off x="4190694" y="3624947"/>
+                <a:ext cx="463075" cy="461665"/>
               </a:xfrm>
               <a:prstGeom prst="rect">
                 <a:avLst/>
@@ -4595,6 +4632,7 @@
               </a:bodyPr>
               <a:lstStyle/>
               <a:p>
+                <a:pPr/>
                 <a14:m>
                   <m:oMathPara xmlns:m="http://schemas.openxmlformats.org/officeDocument/2006/math">
                     <m:oMathParaPr>
@@ -4604,32 +4642,35 @@
                       <m:sSub>
                         <m:sSubPr>
                           <m:ctrlPr>
-                            <a:rPr lang="en-US" b="0" i="1" smtClean="0">
+                            <a:rPr lang="en-US" sz="2400" b="0" i="1" smtClean="0">
                               <a:solidFill>
                                 <a:schemeClr val="tx1"/>
                               </a:solidFill>
                               <a:latin typeface="Cambria Math" panose="02040503050406030204" pitchFamily="18" charset="0"/>
+                              <a:ea typeface="Cambria Math" panose="02040503050406030204" pitchFamily="18" charset="0"/>
                             </a:rPr>
                           </m:ctrlPr>
                         </m:sSubPr>
                         <m:e>
                           <m:r>
-                            <a:rPr lang="en-US" b="0" i="1" smtClean="0">
+                            <a:rPr lang="en-US" sz="2400" b="0" i="1" smtClean="0">
                               <a:solidFill>
                                 <a:schemeClr val="tx1"/>
                               </a:solidFill>
                               <a:latin typeface="Cambria Math" panose="02040503050406030204" pitchFamily="18" charset="0"/>
+                              <a:ea typeface="Cambria Math" panose="02040503050406030204" pitchFamily="18" charset="0"/>
                             </a:rPr>
                             <m:t>𝑟</m:t>
                           </m:r>
                         </m:e>
                         <m:sub>
                           <m:r>
-                            <a:rPr lang="en-US" b="0" i="1" smtClean="0">
+                            <a:rPr lang="en-US" sz="2400" b="0" i="1" smtClean="0">
                               <a:solidFill>
                                 <a:schemeClr val="tx1"/>
                               </a:solidFill>
                               <a:latin typeface="Cambria Math" panose="02040503050406030204" pitchFamily="18" charset="0"/>
+                              <a:ea typeface="Cambria Math" panose="02040503050406030204" pitchFamily="18" charset="0"/>
                             </a:rPr>
                             <m:t>𝑖</m:t>
                           </m:r>
@@ -4638,7 +4679,10 @@
                     </m:oMath>
                   </m:oMathPara>
                 </a14:m>
-                <a:endParaRPr lang="en-US" dirty="0"/>
+                <a:endParaRPr lang="en-US" sz="2400" dirty="0">
+                  <a:latin typeface="Cambria Math" panose="02040503050406030204" pitchFamily="18" charset="0"/>
+                  <a:ea typeface="Cambria Math" panose="02040503050406030204" pitchFamily="18" charset="0"/>
+                </a:endParaRPr>
               </a:p>
             </p:txBody>
           </p:sp>
@@ -4660,8 +4704,8 @@
             </p:nvSpPr>
             <p:spPr>
               <a:xfrm>
-                <a:off x="4190694" y="3688318"/>
-                <a:ext cx="395814" cy="369332"/>
+                <a:off x="4190694" y="3624947"/>
+                <a:ext cx="463075" cy="461665"/>
               </a:xfrm>
               <a:prstGeom prst="rect">
                 <a:avLst/>
@@ -4704,8 +4748,8 @@
             </p:nvSpPr>
             <p:spPr>
               <a:xfrm>
-                <a:off x="4348499" y="4339966"/>
-                <a:ext cx="671915" cy="369332"/>
+                <a:off x="4167433" y="4330913"/>
+                <a:ext cx="806567" cy="461665"/>
               </a:xfrm>
               <a:prstGeom prst="rect">
                 <a:avLst/>
@@ -4718,6 +4762,7 @@
               </a:bodyPr>
               <a:lstStyle/>
               <a:p>
+                <a:pPr/>
                 <a14:m>
                   <m:oMathPara xmlns:m="http://schemas.openxmlformats.org/officeDocument/2006/math">
                     <m:oMathParaPr>
@@ -4727,32 +4772,35 @@
                       <m:sSub>
                         <m:sSubPr>
                           <m:ctrlPr>
-                            <a:rPr lang="en-US" b="0" i="1" smtClean="0">
+                            <a:rPr lang="en-US" sz="2400" b="0" i="1" smtClean="0">
                               <a:solidFill>
                                 <a:schemeClr val="tx1"/>
                               </a:solidFill>
                               <a:latin typeface="Cambria Math" panose="02040503050406030204" pitchFamily="18" charset="0"/>
+                              <a:ea typeface="Cambria Math" panose="02040503050406030204" pitchFamily="18" charset="0"/>
                             </a:rPr>
                           </m:ctrlPr>
                         </m:sSubPr>
                         <m:e>
                           <m:r>
-                            <a:rPr lang="en-US" b="0" i="1" smtClean="0">
+                            <a:rPr lang="en-US" sz="2400" b="0" i="1" smtClean="0">
                               <a:solidFill>
                                 <a:schemeClr val="tx1"/>
                               </a:solidFill>
                               <a:latin typeface="Cambria Math" panose="02040503050406030204" pitchFamily="18" charset="0"/>
+                              <a:ea typeface="Cambria Math" panose="02040503050406030204" pitchFamily="18" charset="0"/>
                             </a:rPr>
                             <m:t>𝑚</m:t>
                           </m:r>
                         </m:e>
                         <m:sub>
                           <m:r>
-                            <a:rPr lang="en-US" b="0" i="1" smtClean="0">
+                            <a:rPr lang="en-US" sz="2400" b="0" i="1" smtClean="0">
                               <a:solidFill>
                                 <a:schemeClr val="tx1"/>
                               </a:solidFill>
                               <a:latin typeface="Cambria Math" panose="02040503050406030204" pitchFamily="18" charset="0"/>
+                              <a:ea typeface="Cambria Math" panose="02040503050406030204" pitchFamily="18" charset="0"/>
                             </a:rPr>
                             <m:t>𝑖</m:t>
                           </m:r>
@@ -4760,20 +4808,22 @@
                             <m:rPr>
                               <m:nor/>
                             </m:rPr>
-                            <a:rPr lang="en-US" b="0" i="0" smtClean="0">
+                            <a:rPr lang="en-US" sz="2400" b="0" i="0" smtClean="0">
                               <a:solidFill>
                                 <a:schemeClr val="tx1"/>
                               </a:solidFill>
                               <a:latin typeface="Cambria Math" panose="02040503050406030204" pitchFamily="18" charset="0"/>
+                              <a:ea typeface="Cambria Math" panose="02040503050406030204" pitchFamily="18" charset="0"/>
                             </a:rPr>
                             <m:t>-</m:t>
                           </m:r>
                           <m:r>
-                            <a:rPr lang="en-US" b="0" i="1" smtClean="0">
+                            <a:rPr lang="en-US" sz="2400" b="0" i="1" smtClean="0">
                               <a:solidFill>
                                 <a:schemeClr val="tx1"/>
                               </a:solidFill>
                               <a:latin typeface="Cambria Math" panose="02040503050406030204" pitchFamily="18" charset="0"/>
+                              <a:ea typeface="Cambria Math" panose="02040503050406030204" pitchFamily="18" charset="0"/>
                             </a:rPr>
                             <m:t>1</m:t>
                           </m:r>
@@ -4782,7 +4832,10 @@
                     </m:oMath>
                   </m:oMathPara>
                 </a14:m>
-                <a:endParaRPr lang="en-US" dirty="0"/>
+                <a:endParaRPr lang="en-US" sz="2400" dirty="0">
+                  <a:latin typeface="Cambria Math" panose="02040503050406030204" pitchFamily="18" charset="0"/>
+                  <a:ea typeface="Cambria Math" panose="02040503050406030204" pitchFamily="18" charset="0"/>
+                </a:endParaRPr>
               </a:p>
             </p:txBody>
           </p:sp>
@@ -4804,8 +4857,8 @@
             </p:nvSpPr>
             <p:spPr>
               <a:xfrm>
-                <a:off x="4348499" y="4339966"/>
-                <a:ext cx="671915" cy="369332"/>
+                <a:off x="4167433" y="4330913"/>
+                <a:ext cx="806567" cy="461665"/>
               </a:xfrm>
               <a:prstGeom prst="rect">
                 <a:avLst/>
@@ -4848,7 +4901,7 @@
         </p:nvCxnSpPr>
         <p:spPr>
           <a:xfrm>
-            <a:off x="3258740" y="2040092"/>
+            <a:off x="3258740" y="2212099"/>
             <a:ext cx="507299" cy="0"/>
           </a:xfrm>
           <a:prstGeom prst="straightConnector1">
@@ -4891,8 +4944,8 @@
         </p:nvSpPr>
         <p:spPr>
           <a:xfrm>
-            <a:off x="3311159" y="1732301"/>
-            <a:ext cx="306494" cy="369332"/>
+            <a:off x="3311159" y="1786619"/>
+            <a:ext cx="352982" cy="461665"/>
           </a:xfrm>
           <a:prstGeom prst="rect">
             <a:avLst/>
@@ -4906,7 +4959,10 @@
           <a:lstStyle/>
           <a:p>
             <a:r>
-              <a:rPr lang="en-US" dirty="0"/>
+              <a:rPr lang="en-US" sz="2400" dirty="0">
+                <a:latin typeface="Cambria Math" panose="02040503050406030204" pitchFamily="18" charset="0"/>
+                <a:ea typeface="Cambria Math" panose="02040503050406030204" pitchFamily="18" charset="0"/>
+              </a:rPr>
               <a:t>q</a:t>
             </a:r>
           </a:p>
@@ -4923,14 +4979,13 @@
           </p:cNvPr>
           <p:cNvCxnSpPr>
             <a:cxnSpLocks/>
-            <a:stCxn id="7" idx="3"/>
           </p:cNvCxnSpPr>
           <p:nvPr/>
         </p:nvCxnSpPr>
         <p:spPr>
           <a:xfrm>
             <a:off x="6441098" y="4057650"/>
-            <a:ext cx="1888508" cy="0"/>
+            <a:ext cx="1336442" cy="0"/>
           </a:xfrm>
           <a:prstGeom prst="straightConnector1">
             <a:avLst/>
@@ -4975,8 +5030,8 @@
             </p:nvSpPr>
             <p:spPr>
               <a:xfrm>
-                <a:off x="8248933" y="3858343"/>
-                <a:ext cx="523798" cy="369332"/>
+                <a:off x="7666132" y="3818666"/>
+                <a:ext cx="609077" cy="461665"/>
               </a:xfrm>
               <a:prstGeom prst="rect">
                 <a:avLst/>
@@ -4989,6 +5044,7 @@
               </a:bodyPr>
               <a:lstStyle/>
               <a:p>
+                <a:pPr/>
                 <a14:m>
                   <m:oMathPara xmlns:m="http://schemas.openxmlformats.org/officeDocument/2006/math">
                     <m:oMathParaPr>
@@ -4998,32 +5054,35 @@
                       <m:sSub>
                         <m:sSubPr>
                           <m:ctrlPr>
-                            <a:rPr lang="en-US" b="0" i="1" smtClean="0">
+                            <a:rPr lang="en-US" sz="2400" b="0" i="1" smtClean="0">
                               <a:solidFill>
                                 <a:schemeClr val="tx1"/>
                               </a:solidFill>
                               <a:latin typeface="Cambria Math" panose="02040503050406030204" pitchFamily="18" charset="0"/>
+                              <a:ea typeface="Cambria Math" panose="02040503050406030204" pitchFamily="18" charset="0"/>
                             </a:rPr>
                           </m:ctrlPr>
                         </m:sSubPr>
                         <m:e>
                           <m:r>
-                            <a:rPr lang="en-US" b="0" i="1" smtClean="0">
+                            <a:rPr lang="en-US" sz="2400" b="0" i="1" smtClean="0">
                               <a:solidFill>
                                 <a:schemeClr val="tx1"/>
                               </a:solidFill>
                               <a:latin typeface="Cambria Math" panose="02040503050406030204" pitchFamily="18" charset="0"/>
+                              <a:ea typeface="Cambria Math" panose="02040503050406030204" pitchFamily="18" charset="0"/>
                             </a:rPr>
                             <m:t>𝑚</m:t>
                           </m:r>
                         </m:e>
                         <m:sub>
                           <m:r>
-                            <a:rPr lang="en-US" b="0" i="1" smtClean="0">
+                            <a:rPr lang="en-US" sz="2400" b="0" i="1" smtClean="0">
                               <a:solidFill>
                                 <a:schemeClr val="tx1"/>
                               </a:solidFill>
                               <a:latin typeface="Cambria Math" panose="02040503050406030204" pitchFamily="18" charset="0"/>
+                              <a:ea typeface="Cambria Math" panose="02040503050406030204" pitchFamily="18" charset="0"/>
                             </a:rPr>
                             <m:t>𝑖</m:t>
                           </m:r>
@@ -5032,7 +5091,10 @@
                     </m:oMath>
                   </m:oMathPara>
                 </a14:m>
-                <a:endParaRPr lang="en-US" dirty="0"/>
+                <a:endParaRPr lang="en-US" sz="2400" dirty="0">
+                  <a:latin typeface="Cambria Math" panose="02040503050406030204" pitchFamily="18" charset="0"/>
+                  <a:ea typeface="Cambria Math" panose="02040503050406030204" pitchFamily="18" charset="0"/>
+                </a:endParaRPr>
               </a:p>
             </p:txBody>
           </p:sp>
@@ -5054,8 +5116,8 @@
             </p:nvSpPr>
             <p:spPr>
               <a:xfrm>
-                <a:off x="8248933" y="3858343"/>
-                <a:ext cx="523798" cy="369332"/>
+                <a:off x="7666132" y="3818666"/>
+                <a:ext cx="609077" cy="461665"/>
               </a:xfrm>
               <a:prstGeom prst="rect">
                 <a:avLst/>
@@ -5097,7 +5159,7 @@
         <p:spPr>
           <a:xfrm>
             <a:off x="3764066" y="669292"/>
-            <a:ext cx="1034194" cy="369332"/>
+            <a:ext cx="1502912" cy="523220"/>
           </a:xfrm>
           <a:prstGeom prst="rect">
             <a:avLst/>
@@ -5111,7 +5173,7 @@
           <a:lstStyle/>
           <a:p>
             <a:r>
-              <a:rPr lang="en-US" dirty="0"/>
+              <a:rPr lang="en-US" sz="2800" dirty="0"/>
               <a:t>MAC Cell</a:t>
             </a:r>
           </a:p>

</xml_diff>

<commit_message>
MAC Cell image added cw
</commit_message>
<xml_diff>
--- a/2018_nips_vigil/img/mac_cell.pptx
+++ b/2018_nips_vigil/img/mac_cell.pptx
@@ -134,7 +134,7 @@
           <p:cNvPr id="2" name="Title 1">
             <a:extLst>
               <a:ext uri="{FF2B5EF4-FFF2-40B4-BE49-F238E27FC236}">
-                <a16:creationId xmlns:a16="http://schemas.microsoft.com/office/drawing/2014/main" id="{015CEFF3-9848-4245-BCF9-6AF63CE4556A}"/>
+                <a16:creationId xmlns:a16="http://schemas.microsoft.com/office/drawing/2014/main" xmlns="" id="{015CEFF3-9848-4245-BCF9-6AF63CE4556A}"/>
               </a:ext>
             </a:extLst>
           </p:cNvPr>
@@ -171,7 +171,7 @@
           <p:cNvPr id="3" name="Subtitle 2">
             <a:extLst>
               <a:ext uri="{FF2B5EF4-FFF2-40B4-BE49-F238E27FC236}">
-                <a16:creationId xmlns:a16="http://schemas.microsoft.com/office/drawing/2014/main" id="{2B36DD5E-7C9B-1C41-9BDD-B688FCF98B09}"/>
+                <a16:creationId xmlns:a16="http://schemas.microsoft.com/office/drawing/2014/main" xmlns="" id="{2B36DD5E-7C9B-1C41-9BDD-B688FCF98B09}"/>
               </a:ext>
             </a:extLst>
           </p:cNvPr>
@@ -241,7 +241,7 @@
           <p:cNvPr id="4" name="Date Placeholder 3">
             <a:extLst>
               <a:ext uri="{FF2B5EF4-FFF2-40B4-BE49-F238E27FC236}">
-                <a16:creationId xmlns:a16="http://schemas.microsoft.com/office/drawing/2014/main" id="{1EAE5164-0368-EE40-BBE8-D24FE42324E5}"/>
+                <a16:creationId xmlns:a16="http://schemas.microsoft.com/office/drawing/2014/main" xmlns="" id="{1EAE5164-0368-EE40-BBE8-D24FE42324E5}"/>
               </a:ext>
             </a:extLst>
           </p:cNvPr>
@@ -259,7 +259,7 @@
           <a:p>
             <a:fld id="{53E7DE36-4596-454C-B21C-42E50E8107FF}" type="datetimeFigureOut">
               <a:rPr lang="en-US" smtClean="0"/>
-              <a:t>10/29/18</a:t>
+              <a:t>11/1/18</a:t>
             </a:fld>
             <a:endParaRPr lang="en-US"/>
           </a:p>
@@ -270,7 +270,7 @@
           <p:cNvPr id="5" name="Footer Placeholder 4">
             <a:extLst>
               <a:ext uri="{FF2B5EF4-FFF2-40B4-BE49-F238E27FC236}">
-                <a16:creationId xmlns:a16="http://schemas.microsoft.com/office/drawing/2014/main" id="{CEF601C2-8A32-1E4F-A98E-CE290304044B}"/>
+                <a16:creationId xmlns:a16="http://schemas.microsoft.com/office/drawing/2014/main" xmlns="" id="{CEF601C2-8A32-1E4F-A98E-CE290304044B}"/>
               </a:ext>
             </a:extLst>
           </p:cNvPr>
@@ -295,7 +295,7 @@
           <p:cNvPr id="6" name="Slide Number Placeholder 5">
             <a:extLst>
               <a:ext uri="{FF2B5EF4-FFF2-40B4-BE49-F238E27FC236}">
-                <a16:creationId xmlns:a16="http://schemas.microsoft.com/office/drawing/2014/main" id="{8E0FE0BF-1E87-D649-B01D-62F5548CD2CD}"/>
+                <a16:creationId xmlns:a16="http://schemas.microsoft.com/office/drawing/2014/main" xmlns="" id="{8E0FE0BF-1E87-D649-B01D-62F5548CD2CD}"/>
               </a:ext>
             </a:extLst>
           </p:cNvPr>
@@ -354,7 +354,7 @@
           <p:cNvPr id="2" name="Title 1">
             <a:extLst>
               <a:ext uri="{FF2B5EF4-FFF2-40B4-BE49-F238E27FC236}">
-                <a16:creationId xmlns:a16="http://schemas.microsoft.com/office/drawing/2014/main" id="{2EA03074-0D25-0440-93DF-69D6D4BE44F3}"/>
+                <a16:creationId xmlns:a16="http://schemas.microsoft.com/office/drawing/2014/main" xmlns="" id="{2EA03074-0D25-0440-93DF-69D6D4BE44F3}"/>
               </a:ext>
             </a:extLst>
           </p:cNvPr>
@@ -382,7 +382,7 @@
           <p:cNvPr id="3" name="Vertical Text Placeholder 2">
             <a:extLst>
               <a:ext uri="{FF2B5EF4-FFF2-40B4-BE49-F238E27FC236}">
-                <a16:creationId xmlns:a16="http://schemas.microsoft.com/office/drawing/2014/main" id="{4261A1CC-6674-6241-990C-FC69F9A97D22}"/>
+                <a16:creationId xmlns:a16="http://schemas.microsoft.com/office/drawing/2014/main" xmlns="" id="{4261A1CC-6674-6241-990C-FC69F9A97D22}"/>
               </a:ext>
             </a:extLst>
           </p:cNvPr>
@@ -439,7 +439,7 @@
           <p:cNvPr id="4" name="Date Placeholder 3">
             <a:extLst>
               <a:ext uri="{FF2B5EF4-FFF2-40B4-BE49-F238E27FC236}">
-                <a16:creationId xmlns:a16="http://schemas.microsoft.com/office/drawing/2014/main" id="{63950BA0-B4E6-2A4D-AB92-0FFA8B1B5258}"/>
+                <a16:creationId xmlns:a16="http://schemas.microsoft.com/office/drawing/2014/main" xmlns="" id="{63950BA0-B4E6-2A4D-AB92-0FFA8B1B5258}"/>
               </a:ext>
             </a:extLst>
           </p:cNvPr>
@@ -457,7 +457,7 @@
           <a:p>
             <a:fld id="{53E7DE36-4596-454C-B21C-42E50E8107FF}" type="datetimeFigureOut">
               <a:rPr lang="en-US" smtClean="0"/>
-              <a:t>10/29/18</a:t>
+              <a:t>11/1/18</a:t>
             </a:fld>
             <a:endParaRPr lang="en-US"/>
           </a:p>
@@ -468,7 +468,7 @@
           <p:cNvPr id="5" name="Footer Placeholder 4">
             <a:extLst>
               <a:ext uri="{FF2B5EF4-FFF2-40B4-BE49-F238E27FC236}">
-                <a16:creationId xmlns:a16="http://schemas.microsoft.com/office/drawing/2014/main" id="{D6AFDF7F-852C-D54A-9CBC-619818B5B5DF}"/>
+                <a16:creationId xmlns:a16="http://schemas.microsoft.com/office/drawing/2014/main" xmlns="" id="{D6AFDF7F-852C-D54A-9CBC-619818B5B5DF}"/>
               </a:ext>
             </a:extLst>
           </p:cNvPr>
@@ -493,7 +493,7 @@
           <p:cNvPr id="6" name="Slide Number Placeholder 5">
             <a:extLst>
               <a:ext uri="{FF2B5EF4-FFF2-40B4-BE49-F238E27FC236}">
-                <a16:creationId xmlns:a16="http://schemas.microsoft.com/office/drawing/2014/main" id="{4FADF136-2B10-FA45-B5FC-753A0D793136}"/>
+                <a16:creationId xmlns:a16="http://schemas.microsoft.com/office/drawing/2014/main" xmlns="" id="{4FADF136-2B10-FA45-B5FC-753A0D793136}"/>
               </a:ext>
             </a:extLst>
           </p:cNvPr>
@@ -552,7 +552,7 @@
           <p:cNvPr id="2" name="Vertical Title 1">
             <a:extLst>
               <a:ext uri="{FF2B5EF4-FFF2-40B4-BE49-F238E27FC236}">
-                <a16:creationId xmlns:a16="http://schemas.microsoft.com/office/drawing/2014/main" id="{3B7F7FFB-4591-2E4A-A074-1F9EA5C423C4}"/>
+                <a16:creationId xmlns:a16="http://schemas.microsoft.com/office/drawing/2014/main" xmlns="" id="{3B7F7FFB-4591-2E4A-A074-1F9EA5C423C4}"/>
               </a:ext>
             </a:extLst>
           </p:cNvPr>
@@ -585,7 +585,7 @@
           <p:cNvPr id="3" name="Vertical Text Placeholder 2">
             <a:extLst>
               <a:ext uri="{FF2B5EF4-FFF2-40B4-BE49-F238E27FC236}">
-                <a16:creationId xmlns:a16="http://schemas.microsoft.com/office/drawing/2014/main" id="{DA9621F5-6A70-FF4D-91F4-6EBEF1E536B8}"/>
+                <a16:creationId xmlns:a16="http://schemas.microsoft.com/office/drawing/2014/main" xmlns="" id="{DA9621F5-6A70-FF4D-91F4-6EBEF1E536B8}"/>
               </a:ext>
             </a:extLst>
           </p:cNvPr>
@@ -647,7 +647,7 @@
           <p:cNvPr id="4" name="Date Placeholder 3">
             <a:extLst>
               <a:ext uri="{FF2B5EF4-FFF2-40B4-BE49-F238E27FC236}">
-                <a16:creationId xmlns:a16="http://schemas.microsoft.com/office/drawing/2014/main" id="{D27CE061-B2B4-0046-A711-67CE8F1412F4}"/>
+                <a16:creationId xmlns:a16="http://schemas.microsoft.com/office/drawing/2014/main" xmlns="" id="{D27CE061-B2B4-0046-A711-67CE8F1412F4}"/>
               </a:ext>
             </a:extLst>
           </p:cNvPr>
@@ -665,7 +665,7 @@
           <a:p>
             <a:fld id="{53E7DE36-4596-454C-B21C-42E50E8107FF}" type="datetimeFigureOut">
               <a:rPr lang="en-US" smtClean="0"/>
-              <a:t>10/29/18</a:t>
+              <a:t>11/1/18</a:t>
             </a:fld>
             <a:endParaRPr lang="en-US"/>
           </a:p>
@@ -676,7 +676,7 @@
           <p:cNvPr id="5" name="Footer Placeholder 4">
             <a:extLst>
               <a:ext uri="{FF2B5EF4-FFF2-40B4-BE49-F238E27FC236}">
-                <a16:creationId xmlns:a16="http://schemas.microsoft.com/office/drawing/2014/main" id="{836B1DD2-AAB4-F841-8E6D-1A65C625631B}"/>
+                <a16:creationId xmlns:a16="http://schemas.microsoft.com/office/drawing/2014/main" xmlns="" id="{836B1DD2-AAB4-F841-8E6D-1A65C625631B}"/>
               </a:ext>
             </a:extLst>
           </p:cNvPr>
@@ -701,7 +701,7 @@
           <p:cNvPr id="6" name="Slide Number Placeholder 5">
             <a:extLst>
               <a:ext uri="{FF2B5EF4-FFF2-40B4-BE49-F238E27FC236}">
-                <a16:creationId xmlns:a16="http://schemas.microsoft.com/office/drawing/2014/main" id="{66985B27-5469-984E-989E-D681CC488D63}"/>
+                <a16:creationId xmlns:a16="http://schemas.microsoft.com/office/drawing/2014/main" xmlns="" id="{66985B27-5469-984E-989E-D681CC488D63}"/>
               </a:ext>
             </a:extLst>
           </p:cNvPr>
@@ -760,7 +760,7 @@
           <p:cNvPr id="2" name="Title 1">
             <a:extLst>
               <a:ext uri="{FF2B5EF4-FFF2-40B4-BE49-F238E27FC236}">
-                <a16:creationId xmlns:a16="http://schemas.microsoft.com/office/drawing/2014/main" id="{F9FD1C6A-D3A7-2548-BA3E-F88929000BE4}"/>
+                <a16:creationId xmlns:a16="http://schemas.microsoft.com/office/drawing/2014/main" xmlns="" id="{F9FD1C6A-D3A7-2548-BA3E-F88929000BE4}"/>
               </a:ext>
             </a:extLst>
           </p:cNvPr>
@@ -788,7 +788,7 @@
           <p:cNvPr id="3" name="Content Placeholder 2">
             <a:extLst>
               <a:ext uri="{FF2B5EF4-FFF2-40B4-BE49-F238E27FC236}">
-                <a16:creationId xmlns:a16="http://schemas.microsoft.com/office/drawing/2014/main" id="{EB6013B4-285B-3D44-8963-F21680F72AA0}"/>
+                <a16:creationId xmlns:a16="http://schemas.microsoft.com/office/drawing/2014/main" xmlns="" id="{EB6013B4-285B-3D44-8963-F21680F72AA0}"/>
               </a:ext>
             </a:extLst>
           </p:cNvPr>
@@ -845,7 +845,7 @@
           <p:cNvPr id="4" name="Date Placeholder 3">
             <a:extLst>
               <a:ext uri="{FF2B5EF4-FFF2-40B4-BE49-F238E27FC236}">
-                <a16:creationId xmlns:a16="http://schemas.microsoft.com/office/drawing/2014/main" id="{445BCAA7-D5F3-7A48-AB7C-9B28C3D74D5C}"/>
+                <a16:creationId xmlns:a16="http://schemas.microsoft.com/office/drawing/2014/main" xmlns="" id="{445BCAA7-D5F3-7A48-AB7C-9B28C3D74D5C}"/>
               </a:ext>
             </a:extLst>
           </p:cNvPr>
@@ -863,7 +863,7 @@
           <a:p>
             <a:fld id="{53E7DE36-4596-454C-B21C-42E50E8107FF}" type="datetimeFigureOut">
               <a:rPr lang="en-US" smtClean="0"/>
-              <a:t>10/29/18</a:t>
+              <a:t>11/1/18</a:t>
             </a:fld>
             <a:endParaRPr lang="en-US"/>
           </a:p>
@@ -874,7 +874,7 @@
           <p:cNvPr id="5" name="Footer Placeholder 4">
             <a:extLst>
               <a:ext uri="{FF2B5EF4-FFF2-40B4-BE49-F238E27FC236}">
-                <a16:creationId xmlns:a16="http://schemas.microsoft.com/office/drawing/2014/main" id="{1585A4AD-FCB3-8B4C-B80C-9FEB06C22DC6}"/>
+                <a16:creationId xmlns:a16="http://schemas.microsoft.com/office/drawing/2014/main" xmlns="" id="{1585A4AD-FCB3-8B4C-B80C-9FEB06C22DC6}"/>
               </a:ext>
             </a:extLst>
           </p:cNvPr>
@@ -899,7 +899,7 @@
           <p:cNvPr id="6" name="Slide Number Placeholder 5">
             <a:extLst>
               <a:ext uri="{FF2B5EF4-FFF2-40B4-BE49-F238E27FC236}">
-                <a16:creationId xmlns:a16="http://schemas.microsoft.com/office/drawing/2014/main" id="{A34D9A65-8DAC-1B48-B3BB-40D6DB3E8CF6}"/>
+                <a16:creationId xmlns:a16="http://schemas.microsoft.com/office/drawing/2014/main" xmlns="" id="{A34D9A65-8DAC-1B48-B3BB-40D6DB3E8CF6}"/>
               </a:ext>
             </a:extLst>
           </p:cNvPr>
@@ -958,7 +958,7 @@
           <p:cNvPr id="2" name="Title 1">
             <a:extLst>
               <a:ext uri="{FF2B5EF4-FFF2-40B4-BE49-F238E27FC236}">
-                <a16:creationId xmlns:a16="http://schemas.microsoft.com/office/drawing/2014/main" id="{CEEA8BD4-E4E5-7340-85D4-EC759D8A613F}"/>
+                <a16:creationId xmlns:a16="http://schemas.microsoft.com/office/drawing/2014/main" xmlns="" id="{CEEA8BD4-E4E5-7340-85D4-EC759D8A613F}"/>
               </a:ext>
             </a:extLst>
           </p:cNvPr>
@@ -995,7 +995,7 @@
           <p:cNvPr id="3" name="Text Placeholder 2">
             <a:extLst>
               <a:ext uri="{FF2B5EF4-FFF2-40B4-BE49-F238E27FC236}">
-                <a16:creationId xmlns:a16="http://schemas.microsoft.com/office/drawing/2014/main" id="{80C9A52C-8185-324E-B862-6E0E47B32A31}"/>
+                <a16:creationId xmlns:a16="http://schemas.microsoft.com/office/drawing/2014/main" xmlns="" id="{80C9A52C-8185-324E-B862-6E0E47B32A31}"/>
               </a:ext>
             </a:extLst>
           </p:cNvPr>
@@ -1120,7 +1120,7 @@
           <p:cNvPr id="4" name="Date Placeholder 3">
             <a:extLst>
               <a:ext uri="{FF2B5EF4-FFF2-40B4-BE49-F238E27FC236}">
-                <a16:creationId xmlns:a16="http://schemas.microsoft.com/office/drawing/2014/main" id="{FC9933E2-F091-1D4A-B2FB-3C12DB803E50}"/>
+                <a16:creationId xmlns:a16="http://schemas.microsoft.com/office/drawing/2014/main" xmlns="" id="{FC9933E2-F091-1D4A-B2FB-3C12DB803E50}"/>
               </a:ext>
             </a:extLst>
           </p:cNvPr>
@@ -1138,7 +1138,7 @@
           <a:p>
             <a:fld id="{53E7DE36-4596-454C-B21C-42E50E8107FF}" type="datetimeFigureOut">
               <a:rPr lang="en-US" smtClean="0"/>
-              <a:t>10/29/18</a:t>
+              <a:t>11/1/18</a:t>
             </a:fld>
             <a:endParaRPr lang="en-US"/>
           </a:p>
@@ -1149,7 +1149,7 @@
           <p:cNvPr id="5" name="Footer Placeholder 4">
             <a:extLst>
               <a:ext uri="{FF2B5EF4-FFF2-40B4-BE49-F238E27FC236}">
-                <a16:creationId xmlns:a16="http://schemas.microsoft.com/office/drawing/2014/main" id="{D9EE769F-F2F2-1B47-A3D7-2E3459BBD8DF}"/>
+                <a16:creationId xmlns:a16="http://schemas.microsoft.com/office/drawing/2014/main" xmlns="" id="{D9EE769F-F2F2-1B47-A3D7-2E3459BBD8DF}"/>
               </a:ext>
             </a:extLst>
           </p:cNvPr>
@@ -1174,7 +1174,7 @@
           <p:cNvPr id="6" name="Slide Number Placeholder 5">
             <a:extLst>
               <a:ext uri="{FF2B5EF4-FFF2-40B4-BE49-F238E27FC236}">
-                <a16:creationId xmlns:a16="http://schemas.microsoft.com/office/drawing/2014/main" id="{1531829C-67AC-0A4A-9146-CA22C0D2F942}"/>
+                <a16:creationId xmlns:a16="http://schemas.microsoft.com/office/drawing/2014/main" xmlns="" id="{1531829C-67AC-0A4A-9146-CA22C0D2F942}"/>
               </a:ext>
             </a:extLst>
           </p:cNvPr>
@@ -1233,7 +1233,7 @@
           <p:cNvPr id="2" name="Title 1">
             <a:extLst>
               <a:ext uri="{FF2B5EF4-FFF2-40B4-BE49-F238E27FC236}">
-                <a16:creationId xmlns:a16="http://schemas.microsoft.com/office/drawing/2014/main" id="{F61CBB94-0617-D94E-85DF-90EFDB88E895}"/>
+                <a16:creationId xmlns:a16="http://schemas.microsoft.com/office/drawing/2014/main" xmlns="" id="{F61CBB94-0617-D94E-85DF-90EFDB88E895}"/>
               </a:ext>
             </a:extLst>
           </p:cNvPr>
@@ -1261,7 +1261,7 @@
           <p:cNvPr id="3" name="Content Placeholder 2">
             <a:extLst>
               <a:ext uri="{FF2B5EF4-FFF2-40B4-BE49-F238E27FC236}">
-                <a16:creationId xmlns:a16="http://schemas.microsoft.com/office/drawing/2014/main" id="{01419EE8-E57E-9E44-90A7-4BD06E41E0CC}"/>
+                <a16:creationId xmlns:a16="http://schemas.microsoft.com/office/drawing/2014/main" xmlns="" id="{01419EE8-E57E-9E44-90A7-4BD06E41E0CC}"/>
               </a:ext>
             </a:extLst>
           </p:cNvPr>
@@ -1323,7 +1323,7 @@
           <p:cNvPr id="4" name="Content Placeholder 3">
             <a:extLst>
               <a:ext uri="{FF2B5EF4-FFF2-40B4-BE49-F238E27FC236}">
-                <a16:creationId xmlns:a16="http://schemas.microsoft.com/office/drawing/2014/main" id="{24D6F269-2CCF-2B48-B626-3BFBDCA874F4}"/>
+                <a16:creationId xmlns:a16="http://schemas.microsoft.com/office/drawing/2014/main" xmlns="" id="{24D6F269-2CCF-2B48-B626-3BFBDCA874F4}"/>
               </a:ext>
             </a:extLst>
           </p:cNvPr>
@@ -1385,7 +1385,7 @@
           <p:cNvPr id="5" name="Date Placeholder 4">
             <a:extLst>
               <a:ext uri="{FF2B5EF4-FFF2-40B4-BE49-F238E27FC236}">
-                <a16:creationId xmlns:a16="http://schemas.microsoft.com/office/drawing/2014/main" id="{A459BBF9-79EF-324A-A216-45AC735F74DC}"/>
+                <a16:creationId xmlns:a16="http://schemas.microsoft.com/office/drawing/2014/main" xmlns="" id="{A459BBF9-79EF-324A-A216-45AC735F74DC}"/>
               </a:ext>
             </a:extLst>
           </p:cNvPr>
@@ -1403,7 +1403,7 @@
           <a:p>
             <a:fld id="{53E7DE36-4596-454C-B21C-42E50E8107FF}" type="datetimeFigureOut">
               <a:rPr lang="en-US" smtClean="0"/>
-              <a:t>10/29/18</a:t>
+              <a:t>11/1/18</a:t>
             </a:fld>
             <a:endParaRPr lang="en-US"/>
           </a:p>
@@ -1414,7 +1414,7 @@
           <p:cNvPr id="6" name="Footer Placeholder 5">
             <a:extLst>
               <a:ext uri="{FF2B5EF4-FFF2-40B4-BE49-F238E27FC236}">
-                <a16:creationId xmlns:a16="http://schemas.microsoft.com/office/drawing/2014/main" id="{426CDDB6-A210-2646-A4E2-1876FDA43FA8}"/>
+                <a16:creationId xmlns:a16="http://schemas.microsoft.com/office/drawing/2014/main" xmlns="" id="{426CDDB6-A210-2646-A4E2-1876FDA43FA8}"/>
               </a:ext>
             </a:extLst>
           </p:cNvPr>
@@ -1439,7 +1439,7 @@
           <p:cNvPr id="7" name="Slide Number Placeholder 6">
             <a:extLst>
               <a:ext uri="{FF2B5EF4-FFF2-40B4-BE49-F238E27FC236}">
-                <a16:creationId xmlns:a16="http://schemas.microsoft.com/office/drawing/2014/main" id="{9308A852-4CB3-C847-878D-643346413AA0}"/>
+                <a16:creationId xmlns:a16="http://schemas.microsoft.com/office/drawing/2014/main" xmlns="" id="{9308A852-4CB3-C847-878D-643346413AA0}"/>
               </a:ext>
             </a:extLst>
           </p:cNvPr>
@@ -1498,7 +1498,7 @@
           <p:cNvPr id="2" name="Title 1">
             <a:extLst>
               <a:ext uri="{FF2B5EF4-FFF2-40B4-BE49-F238E27FC236}">
-                <a16:creationId xmlns:a16="http://schemas.microsoft.com/office/drawing/2014/main" id="{663A63F9-F8EB-2344-A3F6-CEC128ADE944}"/>
+                <a16:creationId xmlns:a16="http://schemas.microsoft.com/office/drawing/2014/main" xmlns="" id="{663A63F9-F8EB-2344-A3F6-CEC128ADE944}"/>
               </a:ext>
             </a:extLst>
           </p:cNvPr>
@@ -1531,7 +1531,7 @@
           <p:cNvPr id="3" name="Text Placeholder 2">
             <a:extLst>
               <a:ext uri="{FF2B5EF4-FFF2-40B4-BE49-F238E27FC236}">
-                <a16:creationId xmlns:a16="http://schemas.microsoft.com/office/drawing/2014/main" id="{83541FB0-DE71-EC4D-AE00-D616C2615A39}"/>
+                <a16:creationId xmlns:a16="http://schemas.microsoft.com/office/drawing/2014/main" xmlns="" id="{83541FB0-DE71-EC4D-AE00-D616C2615A39}"/>
               </a:ext>
             </a:extLst>
           </p:cNvPr>
@@ -1602,7 +1602,7 @@
           <p:cNvPr id="4" name="Content Placeholder 3">
             <a:extLst>
               <a:ext uri="{FF2B5EF4-FFF2-40B4-BE49-F238E27FC236}">
-                <a16:creationId xmlns:a16="http://schemas.microsoft.com/office/drawing/2014/main" id="{E16556F7-C4FF-EC45-9E73-17E61ABC0DC3}"/>
+                <a16:creationId xmlns:a16="http://schemas.microsoft.com/office/drawing/2014/main" xmlns="" id="{E16556F7-C4FF-EC45-9E73-17E61ABC0DC3}"/>
               </a:ext>
             </a:extLst>
           </p:cNvPr>
@@ -1664,7 +1664,7 @@
           <p:cNvPr id="5" name="Text Placeholder 4">
             <a:extLst>
               <a:ext uri="{FF2B5EF4-FFF2-40B4-BE49-F238E27FC236}">
-                <a16:creationId xmlns:a16="http://schemas.microsoft.com/office/drawing/2014/main" id="{19790F94-A000-CA4E-8B0A-F9CF801752EA}"/>
+                <a16:creationId xmlns:a16="http://schemas.microsoft.com/office/drawing/2014/main" xmlns="" id="{19790F94-A000-CA4E-8B0A-F9CF801752EA}"/>
               </a:ext>
             </a:extLst>
           </p:cNvPr>
@@ -1735,7 +1735,7 @@
           <p:cNvPr id="6" name="Content Placeholder 5">
             <a:extLst>
               <a:ext uri="{FF2B5EF4-FFF2-40B4-BE49-F238E27FC236}">
-                <a16:creationId xmlns:a16="http://schemas.microsoft.com/office/drawing/2014/main" id="{BA5D7667-4039-4047-8F38-3FAEEC219D40}"/>
+                <a16:creationId xmlns:a16="http://schemas.microsoft.com/office/drawing/2014/main" xmlns="" id="{BA5D7667-4039-4047-8F38-3FAEEC219D40}"/>
               </a:ext>
             </a:extLst>
           </p:cNvPr>
@@ -1797,7 +1797,7 @@
           <p:cNvPr id="7" name="Date Placeholder 6">
             <a:extLst>
               <a:ext uri="{FF2B5EF4-FFF2-40B4-BE49-F238E27FC236}">
-                <a16:creationId xmlns:a16="http://schemas.microsoft.com/office/drawing/2014/main" id="{82FDDCA7-0053-AD46-92AF-A400225D6169}"/>
+                <a16:creationId xmlns:a16="http://schemas.microsoft.com/office/drawing/2014/main" xmlns="" id="{82FDDCA7-0053-AD46-92AF-A400225D6169}"/>
               </a:ext>
             </a:extLst>
           </p:cNvPr>
@@ -1815,7 +1815,7 @@
           <a:p>
             <a:fld id="{53E7DE36-4596-454C-B21C-42E50E8107FF}" type="datetimeFigureOut">
               <a:rPr lang="en-US" smtClean="0"/>
-              <a:t>10/29/18</a:t>
+              <a:t>11/1/18</a:t>
             </a:fld>
             <a:endParaRPr lang="en-US"/>
           </a:p>
@@ -1826,7 +1826,7 @@
           <p:cNvPr id="8" name="Footer Placeholder 7">
             <a:extLst>
               <a:ext uri="{FF2B5EF4-FFF2-40B4-BE49-F238E27FC236}">
-                <a16:creationId xmlns:a16="http://schemas.microsoft.com/office/drawing/2014/main" id="{1A252996-9563-0242-811C-E63381AC82EB}"/>
+                <a16:creationId xmlns:a16="http://schemas.microsoft.com/office/drawing/2014/main" xmlns="" id="{1A252996-9563-0242-811C-E63381AC82EB}"/>
               </a:ext>
             </a:extLst>
           </p:cNvPr>
@@ -1851,7 +1851,7 @@
           <p:cNvPr id="9" name="Slide Number Placeholder 8">
             <a:extLst>
               <a:ext uri="{FF2B5EF4-FFF2-40B4-BE49-F238E27FC236}">
-                <a16:creationId xmlns:a16="http://schemas.microsoft.com/office/drawing/2014/main" id="{70F099B7-B9B1-2141-983E-8FF05F7BD219}"/>
+                <a16:creationId xmlns:a16="http://schemas.microsoft.com/office/drawing/2014/main" xmlns="" id="{70F099B7-B9B1-2141-983E-8FF05F7BD219}"/>
               </a:ext>
             </a:extLst>
           </p:cNvPr>
@@ -1910,7 +1910,7 @@
           <p:cNvPr id="2" name="Title 1">
             <a:extLst>
               <a:ext uri="{FF2B5EF4-FFF2-40B4-BE49-F238E27FC236}">
-                <a16:creationId xmlns:a16="http://schemas.microsoft.com/office/drawing/2014/main" id="{E0347EE9-B1EC-8449-896B-6AAFCBA37F7A}"/>
+                <a16:creationId xmlns:a16="http://schemas.microsoft.com/office/drawing/2014/main" xmlns="" id="{E0347EE9-B1EC-8449-896B-6AAFCBA37F7A}"/>
               </a:ext>
             </a:extLst>
           </p:cNvPr>
@@ -1938,7 +1938,7 @@
           <p:cNvPr id="3" name="Date Placeholder 2">
             <a:extLst>
               <a:ext uri="{FF2B5EF4-FFF2-40B4-BE49-F238E27FC236}">
-                <a16:creationId xmlns:a16="http://schemas.microsoft.com/office/drawing/2014/main" id="{E3FAE58D-6978-704B-BE3F-54F2EF880354}"/>
+                <a16:creationId xmlns:a16="http://schemas.microsoft.com/office/drawing/2014/main" xmlns="" id="{E3FAE58D-6978-704B-BE3F-54F2EF880354}"/>
               </a:ext>
             </a:extLst>
           </p:cNvPr>
@@ -1956,7 +1956,7 @@
           <a:p>
             <a:fld id="{53E7DE36-4596-454C-B21C-42E50E8107FF}" type="datetimeFigureOut">
               <a:rPr lang="en-US" smtClean="0"/>
-              <a:t>10/29/18</a:t>
+              <a:t>11/1/18</a:t>
             </a:fld>
             <a:endParaRPr lang="en-US"/>
           </a:p>
@@ -1967,7 +1967,7 @@
           <p:cNvPr id="4" name="Footer Placeholder 3">
             <a:extLst>
               <a:ext uri="{FF2B5EF4-FFF2-40B4-BE49-F238E27FC236}">
-                <a16:creationId xmlns:a16="http://schemas.microsoft.com/office/drawing/2014/main" id="{C5C19039-9C4D-E943-826B-8F9DB853BA6F}"/>
+                <a16:creationId xmlns:a16="http://schemas.microsoft.com/office/drawing/2014/main" xmlns="" id="{C5C19039-9C4D-E943-826B-8F9DB853BA6F}"/>
               </a:ext>
             </a:extLst>
           </p:cNvPr>
@@ -1992,7 +1992,7 @@
           <p:cNvPr id="5" name="Slide Number Placeholder 4">
             <a:extLst>
               <a:ext uri="{FF2B5EF4-FFF2-40B4-BE49-F238E27FC236}">
-                <a16:creationId xmlns:a16="http://schemas.microsoft.com/office/drawing/2014/main" id="{E51DDAFD-4EF3-A74C-8B01-AF8C2FA484B9}"/>
+                <a16:creationId xmlns:a16="http://schemas.microsoft.com/office/drawing/2014/main" xmlns="" id="{E51DDAFD-4EF3-A74C-8B01-AF8C2FA484B9}"/>
               </a:ext>
             </a:extLst>
           </p:cNvPr>
@@ -2051,7 +2051,7 @@
           <p:cNvPr id="2" name="Date Placeholder 1">
             <a:extLst>
               <a:ext uri="{FF2B5EF4-FFF2-40B4-BE49-F238E27FC236}">
-                <a16:creationId xmlns:a16="http://schemas.microsoft.com/office/drawing/2014/main" id="{F495D1C8-F643-2C4F-8856-87CC7442D815}"/>
+                <a16:creationId xmlns:a16="http://schemas.microsoft.com/office/drawing/2014/main" xmlns="" id="{F495D1C8-F643-2C4F-8856-87CC7442D815}"/>
               </a:ext>
             </a:extLst>
           </p:cNvPr>
@@ -2069,7 +2069,7 @@
           <a:p>
             <a:fld id="{53E7DE36-4596-454C-B21C-42E50E8107FF}" type="datetimeFigureOut">
               <a:rPr lang="en-US" smtClean="0"/>
-              <a:t>10/29/18</a:t>
+              <a:t>11/1/18</a:t>
             </a:fld>
             <a:endParaRPr lang="en-US"/>
           </a:p>
@@ -2080,7 +2080,7 @@
           <p:cNvPr id="3" name="Footer Placeholder 2">
             <a:extLst>
               <a:ext uri="{FF2B5EF4-FFF2-40B4-BE49-F238E27FC236}">
-                <a16:creationId xmlns:a16="http://schemas.microsoft.com/office/drawing/2014/main" id="{055E85AB-25DE-EE42-A0F0-F4FF0D89D621}"/>
+                <a16:creationId xmlns:a16="http://schemas.microsoft.com/office/drawing/2014/main" xmlns="" id="{055E85AB-25DE-EE42-A0F0-F4FF0D89D621}"/>
               </a:ext>
             </a:extLst>
           </p:cNvPr>
@@ -2105,7 +2105,7 @@
           <p:cNvPr id="4" name="Slide Number Placeholder 3">
             <a:extLst>
               <a:ext uri="{FF2B5EF4-FFF2-40B4-BE49-F238E27FC236}">
-                <a16:creationId xmlns:a16="http://schemas.microsoft.com/office/drawing/2014/main" id="{4D992025-0346-6244-B933-D6BF46FECCFB}"/>
+                <a16:creationId xmlns:a16="http://schemas.microsoft.com/office/drawing/2014/main" xmlns="" id="{4D992025-0346-6244-B933-D6BF46FECCFB}"/>
               </a:ext>
             </a:extLst>
           </p:cNvPr>
@@ -2164,7 +2164,7 @@
           <p:cNvPr id="2" name="Title 1">
             <a:extLst>
               <a:ext uri="{FF2B5EF4-FFF2-40B4-BE49-F238E27FC236}">
-                <a16:creationId xmlns:a16="http://schemas.microsoft.com/office/drawing/2014/main" id="{2B417047-2E6A-F747-9C86-A88266E2F87D}"/>
+                <a16:creationId xmlns:a16="http://schemas.microsoft.com/office/drawing/2014/main" xmlns="" id="{2B417047-2E6A-F747-9C86-A88266E2F87D}"/>
               </a:ext>
             </a:extLst>
           </p:cNvPr>
@@ -2201,7 +2201,7 @@
           <p:cNvPr id="3" name="Content Placeholder 2">
             <a:extLst>
               <a:ext uri="{FF2B5EF4-FFF2-40B4-BE49-F238E27FC236}">
-                <a16:creationId xmlns:a16="http://schemas.microsoft.com/office/drawing/2014/main" id="{3C237CE0-6B90-254E-8F70-B75F5506CF61}"/>
+                <a16:creationId xmlns:a16="http://schemas.microsoft.com/office/drawing/2014/main" xmlns="" id="{3C237CE0-6B90-254E-8F70-B75F5506CF61}"/>
               </a:ext>
             </a:extLst>
           </p:cNvPr>
@@ -2291,7 +2291,7 @@
           <p:cNvPr id="4" name="Text Placeholder 3">
             <a:extLst>
               <a:ext uri="{FF2B5EF4-FFF2-40B4-BE49-F238E27FC236}">
-                <a16:creationId xmlns:a16="http://schemas.microsoft.com/office/drawing/2014/main" id="{B4854B27-BFF2-D14E-B6BC-8B64AD1E6A8E}"/>
+                <a16:creationId xmlns:a16="http://schemas.microsoft.com/office/drawing/2014/main" xmlns="" id="{B4854B27-BFF2-D14E-B6BC-8B64AD1E6A8E}"/>
               </a:ext>
             </a:extLst>
           </p:cNvPr>
@@ -2362,7 +2362,7 @@
           <p:cNvPr id="5" name="Date Placeholder 4">
             <a:extLst>
               <a:ext uri="{FF2B5EF4-FFF2-40B4-BE49-F238E27FC236}">
-                <a16:creationId xmlns:a16="http://schemas.microsoft.com/office/drawing/2014/main" id="{0A511D8B-C9D8-B947-B532-7359B786B7EB}"/>
+                <a16:creationId xmlns:a16="http://schemas.microsoft.com/office/drawing/2014/main" xmlns="" id="{0A511D8B-C9D8-B947-B532-7359B786B7EB}"/>
               </a:ext>
             </a:extLst>
           </p:cNvPr>
@@ -2380,7 +2380,7 @@
           <a:p>
             <a:fld id="{53E7DE36-4596-454C-B21C-42E50E8107FF}" type="datetimeFigureOut">
               <a:rPr lang="en-US" smtClean="0"/>
-              <a:t>10/29/18</a:t>
+              <a:t>11/1/18</a:t>
             </a:fld>
             <a:endParaRPr lang="en-US"/>
           </a:p>
@@ -2391,7 +2391,7 @@
           <p:cNvPr id="6" name="Footer Placeholder 5">
             <a:extLst>
               <a:ext uri="{FF2B5EF4-FFF2-40B4-BE49-F238E27FC236}">
-                <a16:creationId xmlns:a16="http://schemas.microsoft.com/office/drawing/2014/main" id="{7C2088E0-2D3E-004F-B1F4-109CB15B1ADA}"/>
+                <a16:creationId xmlns:a16="http://schemas.microsoft.com/office/drawing/2014/main" xmlns="" id="{7C2088E0-2D3E-004F-B1F4-109CB15B1ADA}"/>
               </a:ext>
             </a:extLst>
           </p:cNvPr>
@@ -2416,7 +2416,7 @@
           <p:cNvPr id="7" name="Slide Number Placeholder 6">
             <a:extLst>
               <a:ext uri="{FF2B5EF4-FFF2-40B4-BE49-F238E27FC236}">
-                <a16:creationId xmlns:a16="http://schemas.microsoft.com/office/drawing/2014/main" id="{9566E01D-9894-3445-AEF3-762EFFE94FE9}"/>
+                <a16:creationId xmlns:a16="http://schemas.microsoft.com/office/drawing/2014/main" xmlns="" id="{9566E01D-9894-3445-AEF3-762EFFE94FE9}"/>
               </a:ext>
             </a:extLst>
           </p:cNvPr>
@@ -2475,7 +2475,7 @@
           <p:cNvPr id="2" name="Title 1">
             <a:extLst>
               <a:ext uri="{FF2B5EF4-FFF2-40B4-BE49-F238E27FC236}">
-                <a16:creationId xmlns:a16="http://schemas.microsoft.com/office/drawing/2014/main" id="{E61E8057-22FA-8E44-A023-D9ECCA74BC7C}"/>
+                <a16:creationId xmlns:a16="http://schemas.microsoft.com/office/drawing/2014/main" xmlns="" id="{E61E8057-22FA-8E44-A023-D9ECCA74BC7C}"/>
               </a:ext>
             </a:extLst>
           </p:cNvPr>
@@ -2512,7 +2512,7 @@
           <p:cNvPr id="3" name="Picture Placeholder 2">
             <a:extLst>
               <a:ext uri="{FF2B5EF4-FFF2-40B4-BE49-F238E27FC236}">
-                <a16:creationId xmlns:a16="http://schemas.microsoft.com/office/drawing/2014/main" id="{3550AD4B-4880-9C4D-AC12-2C62CFF1EEA9}"/>
+                <a16:creationId xmlns:a16="http://schemas.microsoft.com/office/drawing/2014/main" xmlns="" id="{3550AD4B-4880-9C4D-AC12-2C62CFF1EEA9}"/>
               </a:ext>
             </a:extLst>
           </p:cNvPr>
@@ -2579,7 +2579,7 @@
           <p:cNvPr id="4" name="Text Placeholder 3">
             <a:extLst>
               <a:ext uri="{FF2B5EF4-FFF2-40B4-BE49-F238E27FC236}">
-                <a16:creationId xmlns:a16="http://schemas.microsoft.com/office/drawing/2014/main" id="{F4D02E7C-8B7B-4047-86F8-8B4C103C835A}"/>
+                <a16:creationId xmlns:a16="http://schemas.microsoft.com/office/drawing/2014/main" xmlns="" id="{F4D02E7C-8B7B-4047-86F8-8B4C103C835A}"/>
               </a:ext>
             </a:extLst>
           </p:cNvPr>
@@ -2650,7 +2650,7 @@
           <p:cNvPr id="5" name="Date Placeholder 4">
             <a:extLst>
               <a:ext uri="{FF2B5EF4-FFF2-40B4-BE49-F238E27FC236}">
-                <a16:creationId xmlns:a16="http://schemas.microsoft.com/office/drawing/2014/main" id="{1EA93E40-07EB-BA42-BC3E-29A0A14412B7}"/>
+                <a16:creationId xmlns:a16="http://schemas.microsoft.com/office/drawing/2014/main" xmlns="" id="{1EA93E40-07EB-BA42-BC3E-29A0A14412B7}"/>
               </a:ext>
             </a:extLst>
           </p:cNvPr>
@@ -2668,7 +2668,7 @@
           <a:p>
             <a:fld id="{53E7DE36-4596-454C-B21C-42E50E8107FF}" type="datetimeFigureOut">
               <a:rPr lang="en-US" smtClean="0"/>
-              <a:t>10/29/18</a:t>
+              <a:t>11/1/18</a:t>
             </a:fld>
             <a:endParaRPr lang="en-US"/>
           </a:p>
@@ -2679,7 +2679,7 @@
           <p:cNvPr id="6" name="Footer Placeholder 5">
             <a:extLst>
               <a:ext uri="{FF2B5EF4-FFF2-40B4-BE49-F238E27FC236}">
-                <a16:creationId xmlns:a16="http://schemas.microsoft.com/office/drawing/2014/main" id="{C0A1EF30-B0FF-BA4A-8164-9EE9E13D83D5}"/>
+                <a16:creationId xmlns:a16="http://schemas.microsoft.com/office/drawing/2014/main" xmlns="" id="{C0A1EF30-B0FF-BA4A-8164-9EE9E13D83D5}"/>
               </a:ext>
             </a:extLst>
           </p:cNvPr>
@@ -2704,7 +2704,7 @@
           <p:cNvPr id="7" name="Slide Number Placeholder 6">
             <a:extLst>
               <a:ext uri="{FF2B5EF4-FFF2-40B4-BE49-F238E27FC236}">
-                <a16:creationId xmlns:a16="http://schemas.microsoft.com/office/drawing/2014/main" id="{84986786-B4AD-534C-832C-E6602D9CAFAD}"/>
+                <a16:creationId xmlns:a16="http://schemas.microsoft.com/office/drawing/2014/main" xmlns="" id="{84986786-B4AD-534C-832C-E6602D9CAFAD}"/>
               </a:ext>
             </a:extLst>
           </p:cNvPr>
@@ -2768,7 +2768,7 @@
           <p:cNvPr id="2" name="Title Placeholder 1">
             <a:extLst>
               <a:ext uri="{FF2B5EF4-FFF2-40B4-BE49-F238E27FC236}">
-                <a16:creationId xmlns:a16="http://schemas.microsoft.com/office/drawing/2014/main" id="{DF77917C-F634-A74D-9EF2-54384BB0ADEC}"/>
+                <a16:creationId xmlns:a16="http://schemas.microsoft.com/office/drawing/2014/main" xmlns="" id="{DF77917C-F634-A74D-9EF2-54384BB0ADEC}"/>
               </a:ext>
             </a:extLst>
           </p:cNvPr>
@@ -2806,7 +2806,7 @@
           <p:cNvPr id="3" name="Text Placeholder 2">
             <a:extLst>
               <a:ext uri="{FF2B5EF4-FFF2-40B4-BE49-F238E27FC236}">
-                <a16:creationId xmlns:a16="http://schemas.microsoft.com/office/drawing/2014/main" id="{BBB195D9-2FB4-FC49-92DA-17C381912B42}"/>
+                <a16:creationId xmlns:a16="http://schemas.microsoft.com/office/drawing/2014/main" xmlns="" id="{BBB195D9-2FB4-FC49-92DA-17C381912B42}"/>
               </a:ext>
             </a:extLst>
           </p:cNvPr>
@@ -2873,7 +2873,7 @@
           <p:cNvPr id="4" name="Date Placeholder 3">
             <a:extLst>
               <a:ext uri="{FF2B5EF4-FFF2-40B4-BE49-F238E27FC236}">
-                <a16:creationId xmlns:a16="http://schemas.microsoft.com/office/drawing/2014/main" id="{97507CB3-F758-0448-9938-C3E83C241184}"/>
+                <a16:creationId xmlns:a16="http://schemas.microsoft.com/office/drawing/2014/main" xmlns="" id="{97507CB3-F758-0448-9938-C3E83C241184}"/>
               </a:ext>
             </a:extLst>
           </p:cNvPr>
@@ -2909,7 +2909,7 @@
           <a:p>
             <a:fld id="{53E7DE36-4596-454C-B21C-42E50E8107FF}" type="datetimeFigureOut">
               <a:rPr lang="en-US" smtClean="0"/>
-              <a:t>10/29/18</a:t>
+              <a:t>11/1/18</a:t>
             </a:fld>
             <a:endParaRPr lang="en-US"/>
           </a:p>
@@ -2920,7 +2920,7 @@
           <p:cNvPr id="5" name="Footer Placeholder 4">
             <a:extLst>
               <a:ext uri="{FF2B5EF4-FFF2-40B4-BE49-F238E27FC236}">
-                <a16:creationId xmlns:a16="http://schemas.microsoft.com/office/drawing/2014/main" id="{F3B8CA58-3259-9D4D-9138-EEE9A39285CE}"/>
+                <a16:creationId xmlns:a16="http://schemas.microsoft.com/office/drawing/2014/main" xmlns="" id="{F3B8CA58-3259-9D4D-9138-EEE9A39285CE}"/>
               </a:ext>
             </a:extLst>
           </p:cNvPr>
@@ -2963,7 +2963,7 @@
           <p:cNvPr id="6" name="Slide Number Placeholder 5">
             <a:extLst>
               <a:ext uri="{FF2B5EF4-FFF2-40B4-BE49-F238E27FC236}">
-                <a16:creationId xmlns:a16="http://schemas.microsoft.com/office/drawing/2014/main" id="{3BA2A7BB-2F3F-DF42-81DE-E9DAF29CACE6}"/>
+                <a16:creationId xmlns:a16="http://schemas.microsoft.com/office/drawing/2014/main" xmlns="" id="{3BA2A7BB-2F3F-DF42-81DE-E9DAF29CACE6}"/>
               </a:ext>
             </a:extLst>
           </p:cNvPr>
@@ -3331,7 +3331,7 @@
           <p:cNvPr id="4" name="Rounded Rectangle 3">
             <a:extLst>
               <a:ext uri="{FF2B5EF4-FFF2-40B4-BE49-F238E27FC236}">
-                <a16:creationId xmlns:a16="http://schemas.microsoft.com/office/drawing/2014/main" id="{DCC2850C-4574-5A42-8031-306F25203328}"/>
+                <a16:creationId xmlns:a16="http://schemas.microsoft.com/office/drawing/2014/main" xmlns="" id="{DCC2850C-4574-5A42-8031-306F25203328}"/>
               </a:ext>
             </a:extLst>
           </p:cNvPr>
@@ -3340,8 +3340,8 @@
         </p:nvSpPr>
         <p:spPr>
           <a:xfrm>
-            <a:off x="3764066" y="1419361"/>
-            <a:ext cx="1573823" cy="1257300"/>
+            <a:off x="3764066" y="1419360"/>
+            <a:ext cx="1727473" cy="1631086"/>
           </a:xfrm>
           <a:prstGeom prst="roundRect">
             <a:avLst/>
@@ -3375,10 +3375,13 @@
           <a:p>
             <a:pPr algn="ctr"/>
             <a:r>
-              <a:rPr lang="en-US" sz="2400" dirty="0">
+              <a:rPr lang="en-US" sz="3200" dirty="0">
                 <a:solidFill>
                   <a:schemeClr val="tx1"/>
                 </a:solidFill>
+                <a:latin typeface="IBM Plex Sans" charset="0"/>
+                <a:ea typeface="IBM Plex Sans" charset="0"/>
+                <a:cs typeface="IBM Plex Sans" charset="0"/>
               </a:rPr>
               <a:t>Control</a:t>
             </a:r>
@@ -3390,7 +3393,7 @@
           <p:cNvPr id="6" name="Rounded Rectangle 5">
             <a:extLst>
               <a:ext uri="{FF2B5EF4-FFF2-40B4-BE49-F238E27FC236}">
-                <a16:creationId xmlns:a16="http://schemas.microsoft.com/office/drawing/2014/main" id="{92ACBDA6-C9D5-F648-8258-F22E286CD7EB}"/>
+                <a16:creationId xmlns:a16="http://schemas.microsoft.com/office/drawing/2014/main" xmlns="" id="{92ACBDA6-C9D5-F648-8258-F22E286CD7EB}"/>
               </a:ext>
             </a:extLst>
           </p:cNvPr>
@@ -3434,10 +3437,13 @@
           <a:p>
             <a:pPr algn="ctr"/>
             <a:r>
-              <a:rPr lang="en-US" sz="2400" dirty="0">
+              <a:rPr lang="en-US" sz="3200" dirty="0">
                 <a:solidFill>
                   <a:schemeClr val="tx1"/>
                 </a:solidFill>
+                <a:latin typeface="IBM Plex Sans" charset="0"/>
+                <a:ea typeface="IBM Plex Sans" charset="0"/>
+                <a:cs typeface="IBM Plex Sans" charset="0"/>
               </a:rPr>
               <a:t>Read</a:t>
             </a:r>
@@ -3449,7 +3455,7 @@
           <p:cNvPr id="7" name="Rounded Rectangle 6">
             <a:extLst>
               <a:ext uri="{FF2B5EF4-FFF2-40B4-BE49-F238E27FC236}">
-                <a16:creationId xmlns:a16="http://schemas.microsoft.com/office/drawing/2014/main" id="{CAF6A9F9-C364-8148-97B1-1E82EF98E2CE}"/>
+                <a16:creationId xmlns:a16="http://schemas.microsoft.com/office/drawing/2014/main" xmlns="" id="{CAF6A9F9-C364-8148-97B1-1E82EF98E2CE}"/>
               </a:ext>
             </a:extLst>
           </p:cNvPr>
@@ -3491,10 +3497,13 @@
           <a:p>
             <a:pPr algn="ctr"/>
             <a:r>
-              <a:rPr lang="en-US" sz="2400" dirty="0">
+              <a:rPr lang="en-US" sz="3200" dirty="0">
                 <a:solidFill>
                   <a:schemeClr val="tx1"/>
                 </a:solidFill>
+                <a:latin typeface="IBM Plex Sans" charset="0"/>
+                <a:ea typeface="IBM Plex Sans" charset="0"/>
+                <a:cs typeface="IBM Plex Sans" charset="0"/>
               </a:rPr>
               <a:t>Write</a:t>
             </a:r>
@@ -3506,7 +3515,7 @@
           <p:cNvPr id="13" name="Straight Arrow Connector 12">
             <a:extLst>
               <a:ext uri="{FF2B5EF4-FFF2-40B4-BE49-F238E27FC236}">
-                <a16:creationId xmlns:a16="http://schemas.microsoft.com/office/drawing/2014/main" id="{84BABF1F-9BDA-6047-8A77-07C2139D241D}"/>
+                <a16:creationId xmlns:a16="http://schemas.microsoft.com/office/drawing/2014/main" xmlns="" id="{84BABF1F-9BDA-6047-8A77-07C2139D241D}"/>
               </a:ext>
             </a:extLst>
           </p:cNvPr>
@@ -3525,7 +3534,7 @@
           <a:prstGeom prst="straightConnector1">
             <a:avLst/>
           </a:prstGeom>
-          <a:ln w="19050">
+          <a:ln w="25400">
             <a:solidFill>
               <a:schemeClr val="accent1">
                 <a:lumMod val="75000"/>
@@ -3556,7 +3565,7 @@
               <p:cNvPr id="14" name="Oval 13">
                 <a:extLst>
                   <a:ext uri="{FF2B5EF4-FFF2-40B4-BE49-F238E27FC236}">
-                    <a16:creationId xmlns:a16="http://schemas.microsoft.com/office/drawing/2014/main" id="{8094D5F9-F86B-154C-BE37-949B73C2AD08}"/>
+                    <a16:creationId xmlns:a16="http://schemas.microsoft.com/office/drawing/2014/main" xmlns="" id="{8094D5F9-F86B-154C-BE37-949B73C2AD08}"/>
                   </a:ext>
                 </a:extLst>
               </p:cNvPr>
@@ -3567,8 +3576,8 @@
             </p:nvSpPr>
             <p:spPr>
               <a:xfrm>
-                <a:off x="4309833" y="2165700"/>
-                <a:ext cx="457200" cy="457200"/>
+                <a:off x="4286922" y="2467853"/>
+                <a:ext cx="548640" cy="548640"/>
               </a:xfrm>
               <a:prstGeom prst="ellipse">
                 <a:avLst/>
@@ -3610,18 +3619,18 @@
                       <m:sSub>
                         <m:sSubPr>
                           <m:ctrlPr>
-                            <a:rPr lang="en-US" sz="2400" b="0" i="1" smtClean="0">
+                            <a:rPr lang="en-US" sz="2800" b="0" i="1" smtClean="0">
                               <a:solidFill>
                                 <a:schemeClr val="tx1"/>
                               </a:solidFill>
-                              <a:latin typeface="Cambria Math" panose="02040503050406030204" pitchFamily="18" charset="0"/>
+                              <a:latin typeface="Cambria Math" charset="0"/>
                               <a:ea typeface="Cambria Math" panose="02040503050406030204" pitchFamily="18" charset="0"/>
                             </a:rPr>
                           </m:ctrlPr>
                         </m:sSubPr>
                         <m:e>
                           <m:r>
-                            <a:rPr lang="en-US" sz="2400" b="0" i="1" smtClean="0">
+                            <a:rPr lang="en-US" sz="2800" b="0" i="1" smtClean="0">
                               <a:solidFill>
                                 <a:schemeClr val="tx1"/>
                               </a:solidFill>
@@ -3633,7 +3642,7 @@
                         </m:e>
                         <m:sub>
                           <m:r>
-                            <a:rPr lang="en-US" sz="2400" b="0" i="1" smtClean="0">
+                            <a:rPr lang="en-US" sz="2800" b="0" i="1" smtClean="0">
                               <a:solidFill>
                                 <a:schemeClr val="tx1"/>
                               </a:solidFill>
@@ -3647,7 +3656,7 @@
                     </m:oMath>
                   </m:oMathPara>
                 </a14:m>
-                <a:endParaRPr lang="en-US" sz="2400" dirty="0">
+                <a:endParaRPr lang="en-US" sz="2800" dirty="0">
                   <a:solidFill>
                     <a:schemeClr val="tx1"/>
                   </a:solidFill>
@@ -3664,7 +3673,7 @@
               <p:cNvPr id="14" name="Oval 13">
                 <a:extLst>
                   <a:ext uri="{FF2B5EF4-FFF2-40B4-BE49-F238E27FC236}">
-                    <a16:creationId xmlns:a16="http://schemas.microsoft.com/office/drawing/2014/main" id="{8094D5F9-F86B-154C-BE37-949B73C2AD08}"/>
+                    <a16:creationId xmlns:a16="http://schemas.microsoft.com/office/drawing/2014/main" xmlns:a14="http://schemas.microsoft.com/office/drawing/2010/main" xmlns="" id="{8094D5F9-F86B-154C-BE37-949B73C2AD08}"/>
                   </a:ext>
                 </a:extLst>
               </p:cNvPr>
@@ -3675,13 +3684,13 @@
             </p:nvSpPr>
             <p:spPr>
               <a:xfrm>
-                <a:off x="4309833" y="2165700"/>
-                <a:ext cx="457200" cy="457200"/>
+                <a:off x="4286922" y="2467853"/>
+                <a:ext cx="548640" cy="548640"/>
               </a:xfrm>
               <a:prstGeom prst="ellipse">
                 <a:avLst/>
               </a:prstGeom>
-              <a:blipFill>
+              <a:blipFill rotWithShape="0">
                 <a:blip r:embed="rId2"/>
                 <a:stretch>
                   <a:fillRect/>
@@ -3708,7 +3717,7 @@
           <p:cNvPr id="18" name="Straight Arrow Connector 17">
             <a:extLst>
               <a:ext uri="{FF2B5EF4-FFF2-40B4-BE49-F238E27FC236}">
-                <a16:creationId xmlns:a16="http://schemas.microsoft.com/office/drawing/2014/main" id="{E2EFA5D3-F496-614D-9B8B-4AB2B1BC0345}"/>
+                <a16:creationId xmlns:a16="http://schemas.microsoft.com/office/drawing/2014/main" xmlns="" id="{E2EFA5D3-F496-614D-9B8B-4AB2B1BC0345}"/>
               </a:ext>
             </a:extLst>
           </p:cNvPr>
@@ -3725,7 +3734,7 @@
           <a:prstGeom prst="straightConnector1">
             <a:avLst/>
           </a:prstGeom>
-          <a:ln w="19050">
+          <a:ln w="25400">
             <a:solidFill>
               <a:schemeClr val="accent6">
                 <a:lumMod val="75000"/>
@@ -3754,7 +3763,7 @@
           <p:cNvPr id="20" name="Rounded Rectangle 19">
             <a:extLst>
               <a:ext uri="{FF2B5EF4-FFF2-40B4-BE49-F238E27FC236}">
-                <a16:creationId xmlns:a16="http://schemas.microsoft.com/office/drawing/2014/main" id="{457A5C2B-F4F7-7448-923F-47D09D74166E}"/>
+                <a16:creationId xmlns:a16="http://schemas.microsoft.com/office/drawing/2014/main" xmlns="" id="{457A5C2B-F4F7-7448-923F-47D09D74166E}"/>
               </a:ext>
             </a:extLst>
           </p:cNvPr>
@@ -3799,57 +3808,10 @@
       </p:sp>
       <p:cxnSp>
         <p:nvCxnSpPr>
-          <p:cNvPr id="26" name="Elbow Connector 25">
-            <a:extLst>
-              <a:ext uri="{FF2B5EF4-FFF2-40B4-BE49-F238E27FC236}">
-                <a16:creationId xmlns:a16="http://schemas.microsoft.com/office/drawing/2014/main" id="{99FDA6A7-E256-1345-BF42-2D8DFABDAD80}"/>
-              </a:ext>
-            </a:extLst>
-          </p:cNvPr>
-          <p:cNvCxnSpPr>
-            <a:stCxn id="14" idx="6"/>
-            <a:endCxn id="7" idx="0"/>
-          </p:cNvCxnSpPr>
-          <p:nvPr/>
-        </p:nvCxnSpPr>
-        <p:spPr>
-          <a:xfrm>
-            <a:off x="4767033" y="2394300"/>
-            <a:ext cx="887154" cy="1034700"/>
-          </a:xfrm>
-          <a:prstGeom prst="bentConnector2">
-            <a:avLst/>
-          </a:prstGeom>
-          <a:ln w="19050">
-            <a:solidFill>
-              <a:schemeClr val="accent6">
-                <a:lumMod val="75000"/>
-              </a:schemeClr>
-            </a:solidFill>
-            <a:tailEnd type="triangle"/>
-          </a:ln>
-        </p:spPr>
-        <p:style>
-          <a:lnRef idx="1">
-            <a:schemeClr val="accent1"/>
-          </a:lnRef>
-          <a:fillRef idx="0">
-            <a:schemeClr val="accent1"/>
-          </a:fillRef>
-          <a:effectRef idx="0">
-            <a:schemeClr val="accent1"/>
-          </a:effectRef>
-          <a:fontRef idx="minor">
-            <a:schemeClr val="tx1"/>
-          </a:fontRef>
-        </p:style>
-      </p:cxnSp>
-      <p:cxnSp>
-        <p:nvCxnSpPr>
           <p:cNvPr id="28" name="Elbow Connector 27">
             <a:extLst>
               <a:ext uri="{FF2B5EF4-FFF2-40B4-BE49-F238E27FC236}">
-                <a16:creationId xmlns:a16="http://schemas.microsoft.com/office/drawing/2014/main" id="{46CC7E38-2A93-7C4B-96F5-4966755943AA}"/>
+                <a16:creationId xmlns:a16="http://schemas.microsoft.com/office/drawing/2014/main" xmlns="" id="{46CC7E38-2A93-7C4B-96F5-4966755943AA}"/>
               </a:ext>
             </a:extLst>
           </p:cNvPr>
@@ -3861,13 +3823,13 @@
         </p:nvCxnSpPr>
         <p:spPr>
           <a:xfrm rot="10800000" flipV="1">
-            <a:off x="3331241" y="2394300"/>
-            <a:ext cx="978592" cy="1034700"/>
+            <a:off x="3331242" y="2742172"/>
+            <a:ext cx="955681" cy="686827"/>
           </a:xfrm>
           <a:prstGeom prst="bentConnector2">
             <a:avLst/>
           </a:prstGeom>
-          <a:ln w="19050">
+          <a:ln w="25400">
             <a:solidFill>
               <a:schemeClr val="accent6">
                 <a:lumMod val="75000"/>
@@ -3896,26 +3858,27 @@
           <p:cNvPr id="30" name="Elbow Connector 29">
             <a:extLst>
               <a:ext uri="{FF2B5EF4-FFF2-40B4-BE49-F238E27FC236}">
-                <a16:creationId xmlns:a16="http://schemas.microsoft.com/office/drawing/2014/main" id="{AA647BED-B933-5046-9AB0-D023E6058E8A}"/>
+                <a16:creationId xmlns:a16="http://schemas.microsoft.com/office/drawing/2014/main" xmlns="" id="{AA647BED-B933-5046-9AB0-D023E6058E8A}"/>
               </a:ext>
             </a:extLst>
           </p:cNvPr>
           <p:cNvCxnSpPr>
             <a:cxnSpLocks/>
+            <a:stCxn id="14" idx="6"/>
           </p:cNvCxnSpPr>
           <p:nvPr/>
         </p:nvCxnSpPr>
         <p:spPr>
           <a:xfrm flipV="1">
-            <a:off x="5654186" y="1746814"/>
-            <a:ext cx="2123354" cy="647486"/>
+            <a:off x="4835562" y="1746814"/>
+            <a:ext cx="2941978" cy="995359"/>
           </a:xfrm>
           <a:prstGeom prst="bentConnector3">
             <a:avLst>
               <a:gd name="adj1" fmla="val 50000"/>
             </a:avLst>
           </a:prstGeom>
-          <a:ln w="19050" cap="flat">
+          <a:ln w="25400" cap="flat">
             <a:solidFill>
               <a:schemeClr val="accent6">
                 <a:lumMod val="75000"/>
@@ -3945,7 +3908,7 @@
           <p:cNvPr id="38" name="Straight Arrow Connector 37">
             <a:extLst>
               <a:ext uri="{FF2B5EF4-FFF2-40B4-BE49-F238E27FC236}">
-                <a16:creationId xmlns:a16="http://schemas.microsoft.com/office/drawing/2014/main" id="{20E410A6-1319-B246-95AF-E2CC3D559B58}"/>
+                <a16:creationId xmlns:a16="http://schemas.microsoft.com/office/drawing/2014/main" xmlns="" id="{20E410A6-1319-B246-95AF-E2CC3D559B58}"/>
               </a:ext>
             </a:extLst>
           </p:cNvPr>
@@ -3962,7 +3925,7 @@
           <a:prstGeom prst="straightConnector1">
             <a:avLst/>
           </a:prstGeom>
-          <a:ln w="19050">
+          <a:ln w="25400">
             <a:solidFill>
               <a:schemeClr val="accent1">
                 <a:lumMod val="75000"/>
@@ -3991,7 +3954,7 @@
           <p:cNvPr id="52" name="Elbow Connector 51">
             <a:extLst>
               <a:ext uri="{FF2B5EF4-FFF2-40B4-BE49-F238E27FC236}">
-                <a16:creationId xmlns:a16="http://schemas.microsoft.com/office/drawing/2014/main" id="{6C2A533A-F239-5B40-BA28-AA4B4C978F4B}"/>
+                <a16:creationId xmlns:a16="http://schemas.microsoft.com/office/drawing/2014/main" xmlns="" id="{6C2A533A-F239-5B40-BA28-AA4B4C978F4B}"/>
               </a:ext>
             </a:extLst>
           </p:cNvPr>
@@ -4039,7 +4002,7 @@
           <p:cNvPr id="54" name="Elbow Connector 53">
             <a:extLst>
               <a:ext uri="{FF2B5EF4-FFF2-40B4-BE49-F238E27FC236}">
-                <a16:creationId xmlns:a16="http://schemas.microsoft.com/office/drawing/2014/main" id="{3BF9EE61-606A-A24E-A728-7CF3E2E56E8E}"/>
+                <a16:creationId xmlns:a16="http://schemas.microsoft.com/office/drawing/2014/main" xmlns="" id="{3BF9EE61-606A-A24E-A728-7CF3E2E56E8E}"/>
               </a:ext>
             </a:extLst>
           </p:cNvPr>
@@ -4058,7 +4021,7 @@
               <a:gd name="adj1" fmla="val 615"/>
             </a:avLst>
           </a:prstGeom>
-          <a:ln w="19050">
+          <a:ln w="25400">
             <a:solidFill>
               <a:schemeClr val="accent1">
                 <a:lumMod val="75000"/>
@@ -4089,7 +4052,7 @@
               <p:cNvPr id="70" name="TextBox 69">
                 <a:extLst>
                   <a:ext uri="{FF2B5EF4-FFF2-40B4-BE49-F238E27FC236}">
-                    <a16:creationId xmlns:a16="http://schemas.microsoft.com/office/drawing/2014/main" id="{CE291508-D1D6-5C4E-8A97-EFD31DF692DC}"/>
+                    <a16:creationId xmlns:a16="http://schemas.microsoft.com/office/drawing/2014/main" xmlns="" id="{CE291508-D1D6-5C4E-8A97-EFD31DF692DC}"/>
                   </a:ext>
                 </a:extLst>
               </p:cNvPr>
@@ -4099,7 +4062,7 @@
             <p:spPr>
               <a:xfrm>
                 <a:off x="774851" y="1544536"/>
-                <a:ext cx="682046" cy="461665"/>
+                <a:ext cx="764632" cy="523220"/>
               </a:xfrm>
               <a:prstGeom prst="rect">
                 <a:avLst/>
@@ -4122,18 +4085,18 @@
                       <m:sSub>
                         <m:sSubPr>
                           <m:ctrlPr>
-                            <a:rPr lang="en-US" sz="2400" b="0" i="1" smtClean="0">
+                            <a:rPr lang="en-US" sz="2800" b="0" i="1" smtClean="0">
                               <a:solidFill>
                                 <a:schemeClr val="tx1"/>
                               </a:solidFill>
-                              <a:latin typeface="Cambria Math" panose="02040503050406030204" pitchFamily="18" charset="0"/>
+                              <a:latin typeface="Cambria Math" charset="0"/>
                               <a:ea typeface="Cambria Math" panose="02040503050406030204" pitchFamily="18" charset="0"/>
                             </a:rPr>
                           </m:ctrlPr>
                         </m:sSubPr>
                         <m:e>
                           <m:r>
-                            <a:rPr lang="en-US" sz="2400" b="0" i="1" smtClean="0">
+                            <a:rPr lang="en-US" sz="2800" b="0" i="1" smtClean="0">
                               <a:solidFill>
                                 <a:schemeClr val="tx1"/>
                               </a:solidFill>
@@ -4145,7 +4108,7 @@
                         </m:e>
                         <m:sub>
                           <m:r>
-                            <a:rPr lang="en-US" sz="2400" b="0" i="1" smtClean="0">
+                            <a:rPr lang="en-US" sz="2800" b="0" i="1" smtClean="0">
                               <a:solidFill>
                                 <a:schemeClr val="tx1"/>
                               </a:solidFill>
@@ -4158,7 +4121,7 @@
                             <m:rPr>
                               <m:nor/>
                             </m:rPr>
-                            <a:rPr lang="en-US" sz="2400" b="0" i="0" smtClean="0">
+                            <a:rPr lang="en-US" sz="2800" b="0" i="0" smtClean="0">
                               <a:solidFill>
                                 <a:schemeClr val="tx1"/>
                               </a:solidFill>
@@ -4168,7 +4131,7 @@
                             <m:t>-</m:t>
                           </m:r>
                           <m:r>
-                            <a:rPr lang="en-US" sz="2400" b="0" i="1" smtClean="0">
+                            <a:rPr lang="en-US" sz="2800" b="0" i="1" smtClean="0">
                               <a:solidFill>
                                 <a:schemeClr val="tx1"/>
                               </a:solidFill>
@@ -4182,7 +4145,7 @@
                     </m:oMath>
                   </m:oMathPara>
                 </a14:m>
-                <a:endParaRPr lang="en-US" sz="2400" dirty="0">
+                <a:endParaRPr lang="en-US" sz="2800" dirty="0">
                   <a:latin typeface="Cambria Math" panose="02040503050406030204" pitchFamily="18" charset="0"/>
                   <a:ea typeface="Cambria Math" panose="02040503050406030204" pitchFamily="18" charset="0"/>
                 </a:endParaRPr>
@@ -4196,7 +4159,7 @@
               <p:cNvPr id="70" name="TextBox 69">
                 <a:extLst>
                   <a:ext uri="{FF2B5EF4-FFF2-40B4-BE49-F238E27FC236}">
-                    <a16:creationId xmlns:a16="http://schemas.microsoft.com/office/drawing/2014/main" id="{CE291508-D1D6-5C4E-8A97-EFD31DF692DC}"/>
+                    <a16:creationId xmlns:a16="http://schemas.microsoft.com/office/drawing/2014/main" xmlns:a14="http://schemas.microsoft.com/office/drawing/2010/main" xmlns="" id="{CE291508-D1D6-5C4E-8A97-EFD31DF692DC}"/>
                   </a:ext>
                 </a:extLst>
               </p:cNvPr>
@@ -4208,12 +4171,12 @@
             <p:spPr>
               <a:xfrm>
                 <a:off x="774851" y="1544536"/>
-                <a:ext cx="682046" cy="461665"/>
+                <a:ext cx="764632" cy="523220"/>
               </a:xfrm>
               <a:prstGeom prst="rect">
                 <a:avLst/>
               </a:prstGeom>
-              <a:blipFill>
+              <a:blipFill rotWithShape="0">
                 <a:blip r:embed="rId3"/>
                 <a:stretch>
                   <a:fillRect/>
@@ -4242,7 +4205,7 @@
               <p:cNvPr id="72" name="TextBox 71">
                 <a:extLst>
                   <a:ext uri="{FF2B5EF4-FFF2-40B4-BE49-F238E27FC236}">
-                    <a16:creationId xmlns:a16="http://schemas.microsoft.com/office/drawing/2014/main" id="{F0611135-8D92-9346-81C1-6068CE3B1401}"/>
+                    <a16:creationId xmlns:a16="http://schemas.microsoft.com/office/drawing/2014/main" xmlns="" id="{F0611135-8D92-9346-81C1-6068CE3B1401}"/>
                   </a:ext>
                 </a:extLst>
               </p:cNvPr>
@@ -4252,7 +4215,7 @@
             <p:spPr>
               <a:xfrm>
                 <a:off x="633393" y="3845825"/>
-                <a:ext cx="806567" cy="461665"/>
+                <a:ext cx="909673" cy="523220"/>
               </a:xfrm>
               <a:prstGeom prst="rect">
                 <a:avLst/>
@@ -4275,18 +4238,18 @@
                       <m:sSub>
                         <m:sSubPr>
                           <m:ctrlPr>
-                            <a:rPr lang="en-US" sz="2400" b="0" i="1" smtClean="0">
+                            <a:rPr lang="en-US" sz="2800" b="0" i="1" smtClean="0">
                               <a:solidFill>
                                 <a:schemeClr val="tx1"/>
                               </a:solidFill>
-                              <a:latin typeface="Cambria Math" panose="02040503050406030204" pitchFamily="18" charset="0"/>
+                              <a:latin typeface="Cambria Math" charset="0"/>
                               <a:ea typeface="Cambria Math" panose="02040503050406030204" pitchFamily="18" charset="0"/>
                             </a:rPr>
                           </m:ctrlPr>
                         </m:sSubPr>
                         <m:e>
                           <m:r>
-                            <a:rPr lang="en-US" sz="2400" b="0" i="1" smtClean="0">
+                            <a:rPr lang="en-US" sz="2800" b="0" i="1" smtClean="0">
                               <a:solidFill>
                                 <a:schemeClr val="tx1"/>
                               </a:solidFill>
@@ -4298,7 +4261,7 @@
                         </m:e>
                         <m:sub>
                           <m:r>
-                            <a:rPr lang="en-US" sz="2400" b="0" i="1" smtClean="0">
+                            <a:rPr lang="en-US" sz="2800" b="0" i="1" smtClean="0">
                               <a:solidFill>
                                 <a:schemeClr val="tx1"/>
                               </a:solidFill>
@@ -4311,7 +4274,7 @@
                             <m:rPr>
                               <m:nor/>
                             </m:rPr>
-                            <a:rPr lang="en-US" sz="2400" b="0" i="0" smtClean="0">
+                            <a:rPr lang="en-US" sz="2800" b="0" i="0" smtClean="0">
                               <a:solidFill>
                                 <a:schemeClr val="tx1"/>
                               </a:solidFill>
@@ -4321,7 +4284,7 @@
                             <m:t>-</m:t>
                           </m:r>
                           <m:r>
-                            <a:rPr lang="en-US" sz="2400" b="0" i="1" smtClean="0">
+                            <a:rPr lang="en-US" sz="2800" b="0" i="1" smtClean="0">
                               <a:solidFill>
                                 <a:schemeClr val="tx1"/>
                               </a:solidFill>
@@ -4335,7 +4298,7 @@
                     </m:oMath>
                   </m:oMathPara>
                 </a14:m>
-                <a:endParaRPr lang="en-US" sz="2400" dirty="0">
+                <a:endParaRPr lang="en-US" sz="2800" dirty="0">
                   <a:latin typeface="Cambria Math" panose="02040503050406030204" pitchFamily="18" charset="0"/>
                   <a:ea typeface="Cambria Math" panose="02040503050406030204" pitchFamily="18" charset="0"/>
                 </a:endParaRPr>
@@ -4349,7 +4312,7 @@
               <p:cNvPr id="72" name="TextBox 71">
                 <a:extLst>
                   <a:ext uri="{FF2B5EF4-FFF2-40B4-BE49-F238E27FC236}">
-                    <a16:creationId xmlns:a16="http://schemas.microsoft.com/office/drawing/2014/main" id="{F0611135-8D92-9346-81C1-6068CE3B1401}"/>
+                    <a16:creationId xmlns:a16="http://schemas.microsoft.com/office/drawing/2014/main" xmlns:a14="http://schemas.microsoft.com/office/drawing/2010/main" xmlns="" id="{F0611135-8D92-9346-81C1-6068CE3B1401}"/>
                   </a:ext>
                 </a:extLst>
               </p:cNvPr>
@@ -4361,12 +4324,12 @@
             <p:spPr>
               <a:xfrm>
                 <a:off x="633393" y="3845825"/>
-                <a:ext cx="806567" cy="461665"/>
+                <a:ext cx="909673" cy="523220"/>
               </a:xfrm>
               <a:prstGeom prst="rect">
                 <a:avLst/>
               </a:prstGeom>
-              <a:blipFill>
+              <a:blipFill rotWithShape="0">
                 <a:blip r:embed="rId4"/>
                 <a:stretch>
                   <a:fillRect/>
@@ -4395,7 +4358,7 @@
               <p:cNvPr id="73" name="TextBox 72">
                 <a:extLst>
                   <a:ext uri="{FF2B5EF4-FFF2-40B4-BE49-F238E27FC236}">
-                    <a16:creationId xmlns:a16="http://schemas.microsoft.com/office/drawing/2014/main" id="{A1679EA1-CB42-AE48-9098-C744C9289110}"/>
+                    <a16:creationId xmlns:a16="http://schemas.microsoft.com/office/drawing/2014/main" xmlns="" id="{A1679EA1-CB42-AE48-9098-C744C9289110}"/>
                   </a:ext>
                 </a:extLst>
               </p:cNvPr>
@@ -4405,7 +4368,7 @@
             <p:spPr>
               <a:xfrm>
                 <a:off x="7670945" y="1511423"/>
-                <a:ext cx="484556" cy="461665"/>
+                <a:ext cx="534698" cy="523220"/>
               </a:xfrm>
               <a:prstGeom prst="rect">
                 <a:avLst/>
@@ -4428,18 +4391,18 @@
                       <m:sSub>
                         <m:sSubPr>
                           <m:ctrlPr>
-                            <a:rPr lang="en-US" sz="2400" b="0" i="1" smtClean="0">
+                            <a:rPr lang="en-US" sz="2800" b="0" i="1" smtClean="0">
                               <a:solidFill>
                                 <a:schemeClr val="tx1"/>
                               </a:solidFill>
-                              <a:latin typeface="Cambria Math" panose="02040503050406030204" pitchFamily="18" charset="0"/>
+                              <a:latin typeface="Cambria Math" charset="0"/>
                               <a:ea typeface="Cambria Math" panose="02040503050406030204" pitchFamily="18" charset="0"/>
                             </a:rPr>
                           </m:ctrlPr>
                         </m:sSubPr>
                         <m:e>
                           <m:r>
-                            <a:rPr lang="en-US" sz="2400" b="0" i="1" smtClean="0">
+                            <a:rPr lang="en-US" sz="2800" b="0" i="1" smtClean="0">
                               <a:solidFill>
                                 <a:schemeClr val="tx1"/>
                               </a:solidFill>
@@ -4451,7 +4414,7 @@
                         </m:e>
                         <m:sub>
                           <m:r>
-                            <a:rPr lang="en-US" sz="2400" b="0" i="1" smtClean="0">
+                            <a:rPr lang="en-US" sz="2800" b="0" i="1" smtClean="0">
                               <a:solidFill>
                                 <a:schemeClr val="tx1"/>
                               </a:solidFill>
@@ -4465,7 +4428,7 @@
                     </m:oMath>
                   </m:oMathPara>
                 </a14:m>
-                <a:endParaRPr lang="en-US" sz="2400" dirty="0">
+                <a:endParaRPr lang="en-US" sz="2800" dirty="0">
                   <a:latin typeface="Cambria Math" panose="02040503050406030204" pitchFamily="18" charset="0"/>
                   <a:ea typeface="Cambria Math" panose="02040503050406030204" pitchFamily="18" charset="0"/>
                 </a:endParaRPr>
@@ -4479,7 +4442,7 @@
               <p:cNvPr id="73" name="TextBox 72">
                 <a:extLst>
                   <a:ext uri="{FF2B5EF4-FFF2-40B4-BE49-F238E27FC236}">
-                    <a16:creationId xmlns:a16="http://schemas.microsoft.com/office/drawing/2014/main" id="{A1679EA1-CB42-AE48-9098-C744C9289110}"/>
+                    <a16:creationId xmlns:a16="http://schemas.microsoft.com/office/drawing/2014/main" xmlns:a14="http://schemas.microsoft.com/office/drawing/2010/main" xmlns="" id="{A1679EA1-CB42-AE48-9098-C744C9289110}"/>
                   </a:ext>
                 </a:extLst>
               </p:cNvPr>
@@ -4491,12 +4454,12 @@
             <p:spPr>
               <a:xfrm>
                 <a:off x="7670945" y="1511423"/>
-                <a:ext cx="484556" cy="461665"/>
+                <a:ext cx="534698" cy="523220"/>
               </a:xfrm>
               <a:prstGeom prst="rect">
                 <a:avLst/>
               </a:prstGeom>
-              <a:blipFill>
+              <a:blipFill rotWithShape="0">
                 <a:blip r:embed="rId5"/>
                 <a:stretch>
                   <a:fillRect/>
@@ -4518,90 +4481,6 @@
           </p:sp>
         </mc:Fallback>
       </mc:AlternateContent>
-      <p:cxnSp>
-        <p:nvCxnSpPr>
-          <p:cNvPr id="75" name="Straight Arrow Connector 74">
-            <a:extLst>
-              <a:ext uri="{FF2B5EF4-FFF2-40B4-BE49-F238E27FC236}">
-                <a16:creationId xmlns:a16="http://schemas.microsoft.com/office/drawing/2014/main" id="{79826A06-B4FB-0446-B8F5-56A6C1FEB5F2}"/>
-              </a:ext>
-            </a:extLst>
-          </p:cNvPr>
-          <p:cNvCxnSpPr>
-            <a:cxnSpLocks/>
-          </p:cNvCxnSpPr>
-          <p:nvPr/>
-        </p:nvCxnSpPr>
-        <p:spPr>
-          <a:xfrm>
-            <a:off x="2037030" y="3684760"/>
-            <a:ext cx="507299" cy="0"/>
-          </a:xfrm>
-          <a:prstGeom prst="straightConnector1">
-            <a:avLst/>
-          </a:prstGeom>
-          <a:ln w="19050" cmpd="sng">
-            <a:solidFill>
-              <a:srgbClr val="9B419F"/>
-            </a:solidFill>
-            <a:prstDash val="sysDash"/>
-            <a:miter lim="800000"/>
-            <a:tailEnd type="triangle"/>
-          </a:ln>
-        </p:spPr>
-        <p:style>
-          <a:lnRef idx="1">
-            <a:schemeClr val="accent1"/>
-          </a:lnRef>
-          <a:fillRef idx="0">
-            <a:schemeClr val="accent1"/>
-          </a:fillRef>
-          <a:effectRef idx="0">
-            <a:schemeClr val="accent1"/>
-          </a:effectRef>
-          <a:fontRef idx="minor">
-            <a:schemeClr val="tx1"/>
-          </a:fontRef>
-        </p:style>
-      </p:cxnSp>
-      <p:sp>
-        <p:nvSpPr>
-          <p:cNvPr id="77" name="TextBox 76">
-            <a:extLst>
-              <a:ext uri="{FF2B5EF4-FFF2-40B4-BE49-F238E27FC236}">
-                <a16:creationId xmlns:a16="http://schemas.microsoft.com/office/drawing/2014/main" id="{CF6AC295-406E-4D4E-9585-090BD8CD25DA}"/>
-              </a:ext>
-            </a:extLst>
-          </p:cNvPr>
-          <p:cNvSpPr txBox="1"/>
-          <p:nvPr/>
-        </p:nvSpPr>
-        <p:spPr>
-          <a:xfrm>
-            <a:off x="2017025" y="3331704"/>
-            <a:ext cx="566181" cy="461665"/>
-          </a:xfrm>
-          <a:prstGeom prst="rect">
-            <a:avLst/>
-          </a:prstGeom>
-          <a:noFill/>
-        </p:spPr>
-        <p:txBody>
-          <a:bodyPr wrap="none" rtlCol="0">
-            <a:spAutoFit/>
-          </a:bodyPr>
-          <a:lstStyle/>
-          <a:p>
-            <a:r>
-              <a:rPr lang="en-US" sz="2400" dirty="0">
-                <a:latin typeface="Cambria Math" panose="02040503050406030204" pitchFamily="18" charset="0"/>
-                <a:ea typeface="Cambria Math" panose="02040503050406030204" pitchFamily="18" charset="0"/>
-              </a:rPr>
-              <a:t>KB</a:t>
-            </a:r>
-          </a:p>
-        </p:txBody>
-      </p:sp>
       <mc:AlternateContent xmlns:mc="http://schemas.openxmlformats.org/markup-compatibility/2006">
         <mc:Choice xmlns:a14="http://schemas.microsoft.com/office/drawing/2010/main" Requires="a14">
           <p:sp>
@@ -4609,7 +4488,7 @@
               <p:cNvPr id="78" name="TextBox 77">
                 <a:extLst>
                   <a:ext uri="{FF2B5EF4-FFF2-40B4-BE49-F238E27FC236}">
-                    <a16:creationId xmlns:a16="http://schemas.microsoft.com/office/drawing/2014/main" id="{E6D33358-B9EF-484A-A775-7CB8A3E0E83F}"/>
+                    <a16:creationId xmlns:a16="http://schemas.microsoft.com/office/drawing/2014/main" xmlns="" id="{E6D33358-B9EF-484A-A775-7CB8A3E0E83F}"/>
                   </a:ext>
                 </a:extLst>
               </p:cNvPr>
@@ -4618,8 +4497,8 @@
             </p:nvSpPr>
             <p:spPr>
               <a:xfrm>
-                <a:off x="4190694" y="3624947"/>
-                <a:ext cx="463075" cy="461665"/>
+                <a:off x="4203394" y="3561447"/>
+                <a:ext cx="510461" cy="523220"/>
               </a:xfrm>
               <a:prstGeom prst="rect">
                 <a:avLst/>
@@ -4642,18 +4521,18 @@
                       <m:sSub>
                         <m:sSubPr>
                           <m:ctrlPr>
-                            <a:rPr lang="en-US" sz="2400" b="0" i="1" smtClean="0">
+                            <a:rPr lang="en-US" sz="2800" b="0" i="1" smtClean="0">
                               <a:solidFill>
                                 <a:schemeClr val="tx1"/>
                               </a:solidFill>
-                              <a:latin typeface="Cambria Math" panose="02040503050406030204" pitchFamily="18" charset="0"/>
+                              <a:latin typeface="Cambria Math" charset="0"/>
                               <a:ea typeface="Cambria Math" panose="02040503050406030204" pitchFamily="18" charset="0"/>
                             </a:rPr>
                           </m:ctrlPr>
                         </m:sSubPr>
                         <m:e>
                           <m:r>
-                            <a:rPr lang="en-US" sz="2400" b="0" i="1" smtClean="0">
+                            <a:rPr lang="en-US" sz="2800" b="0" i="1" smtClean="0">
                               <a:solidFill>
                                 <a:schemeClr val="tx1"/>
                               </a:solidFill>
@@ -4665,7 +4544,7 @@
                         </m:e>
                         <m:sub>
                           <m:r>
-                            <a:rPr lang="en-US" sz="2400" b="0" i="1" smtClean="0">
+                            <a:rPr lang="en-US" sz="2800" b="0" i="1" smtClean="0">
                               <a:solidFill>
                                 <a:schemeClr val="tx1"/>
                               </a:solidFill>
@@ -4679,7 +4558,7 @@
                     </m:oMath>
                   </m:oMathPara>
                 </a14:m>
-                <a:endParaRPr lang="en-US" sz="2400" dirty="0">
+                <a:endParaRPr lang="en-US" sz="2800" dirty="0">
                   <a:latin typeface="Cambria Math" panose="02040503050406030204" pitchFamily="18" charset="0"/>
                   <a:ea typeface="Cambria Math" panose="02040503050406030204" pitchFamily="18" charset="0"/>
                 </a:endParaRPr>
@@ -4693,7 +4572,7 @@
               <p:cNvPr id="78" name="TextBox 77">
                 <a:extLst>
                   <a:ext uri="{FF2B5EF4-FFF2-40B4-BE49-F238E27FC236}">
-                    <a16:creationId xmlns:a16="http://schemas.microsoft.com/office/drawing/2014/main" id="{E6D33358-B9EF-484A-A775-7CB8A3E0E83F}"/>
+                    <a16:creationId xmlns:a16="http://schemas.microsoft.com/office/drawing/2014/main" xmlns:a14="http://schemas.microsoft.com/office/drawing/2010/main" xmlns="" id="{E6D33358-B9EF-484A-A775-7CB8A3E0E83F}"/>
                   </a:ext>
                 </a:extLst>
               </p:cNvPr>
@@ -4704,13 +4583,13 @@
             </p:nvSpPr>
             <p:spPr>
               <a:xfrm>
-                <a:off x="4190694" y="3624947"/>
-                <a:ext cx="463075" cy="461665"/>
+                <a:off x="4203394" y="3561447"/>
+                <a:ext cx="510461" cy="523220"/>
               </a:xfrm>
               <a:prstGeom prst="rect">
                 <a:avLst/>
               </a:prstGeom>
-              <a:blipFill>
+              <a:blipFill rotWithShape="0">
                 <a:blip r:embed="rId6"/>
                 <a:stretch>
                   <a:fillRect/>
@@ -4739,7 +4618,7 @@
               <p:cNvPr id="79" name="TextBox 78">
                 <a:extLst>
                   <a:ext uri="{FF2B5EF4-FFF2-40B4-BE49-F238E27FC236}">
-                    <a16:creationId xmlns:a16="http://schemas.microsoft.com/office/drawing/2014/main" id="{3678D4C3-489F-4845-97A3-D3EC8FB1390A}"/>
+                    <a16:creationId xmlns:a16="http://schemas.microsoft.com/office/drawing/2014/main" xmlns="" id="{3678D4C3-489F-4845-97A3-D3EC8FB1390A}"/>
                   </a:ext>
                 </a:extLst>
               </p:cNvPr>
@@ -4748,8 +4627,8 @@
             </p:nvSpPr>
             <p:spPr>
               <a:xfrm>
-                <a:off x="4167433" y="4330913"/>
-                <a:ext cx="806567" cy="461665"/>
+                <a:off x="4167433" y="4280113"/>
+                <a:ext cx="909673" cy="523220"/>
               </a:xfrm>
               <a:prstGeom prst="rect">
                 <a:avLst/>
@@ -4772,18 +4651,18 @@
                       <m:sSub>
                         <m:sSubPr>
                           <m:ctrlPr>
-                            <a:rPr lang="en-US" sz="2400" b="0" i="1" smtClean="0">
+                            <a:rPr lang="en-US" sz="2800" b="0" i="1" smtClean="0">
                               <a:solidFill>
                                 <a:schemeClr val="tx1"/>
                               </a:solidFill>
-                              <a:latin typeface="Cambria Math" panose="02040503050406030204" pitchFamily="18" charset="0"/>
+                              <a:latin typeface="Cambria Math" charset="0"/>
                               <a:ea typeface="Cambria Math" panose="02040503050406030204" pitchFamily="18" charset="0"/>
                             </a:rPr>
                           </m:ctrlPr>
                         </m:sSubPr>
                         <m:e>
                           <m:r>
-                            <a:rPr lang="en-US" sz="2400" b="0" i="1" smtClean="0">
+                            <a:rPr lang="en-US" sz="2800" b="0" i="1" smtClean="0">
                               <a:solidFill>
                                 <a:schemeClr val="tx1"/>
                               </a:solidFill>
@@ -4795,7 +4674,7 @@
                         </m:e>
                         <m:sub>
                           <m:r>
-                            <a:rPr lang="en-US" sz="2400" b="0" i="1" smtClean="0">
+                            <a:rPr lang="en-US" sz="2800" b="0" i="1" smtClean="0">
                               <a:solidFill>
                                 <a:schemeClr val="tx1"/>
                               </a:solidFill>
@@ -4808,7 +4687,7 @@
                             <m:rPr>
                               <m:nor/>
                             </m:rPr>
-                            <a:rPr lang="en-US" sz="2400" b="0" i="0" smtClean="0">
+                            <a:rPr lang="en-US" sz="2800" b="0" i="0" smtClean="0">
                               <a:solidFill>
                                 <a:schemeClr val="tx1"/>
                               </a:solidFill>
@@ -4818,7 +4697,7 @@
                             <m:t>-</m:t>
                           </m:r>
                           <m:r>
-                            <a:rPr lang="en-US" sz="2400" b="0" i="1" smtClean="0">
+                            <a:rPr lang="en-US" sz="2800" b="0" i="1" smtClean="0">
                               <a:solidFill>
                                 <a:schemeClr val="tx1"/>
                               </a:solidFill>
@@ -4832,7 +4711,7 @@
                     </m:oMath>
                   </m:oMathPara>
                 </a14:m>
-                <a:endParaRPr lang="en-US" sz="2400" dirty="0">
+                <a:endParaRPr lang="en-US" sz="2800" dirty="0">
                   <a:latin typeface="Cambria Math" panose="02040503050406030204" pitchFamily="18" charset="0"/>
                   <a:ea typeface="Cambria Math" panose="02040503050406030204" pitchFamily="18" charset="0"/>
                 </a:endParaRPr>
@@ -4846,7 +4725,7 @@
               <p:cNvPr id="79" name="TextBox 78">
                 <a:extLst>
                   <a:ext uri="{FF2B5EF4-FFF2-40B4-BE49-F238E27FC236}">
-                    <a16:creationId xmlns:a16="http://schemas.microsoft.com/office/drawing/2014/main" id="{3678D4C3-489F-4845-97A3-D3EC8FB1390A}"/>
+                    <a16:creationId xmlns:a16="http://schemas.microsoft.com/office/drawing/2014/main" xmlns:a14="http://schemas.microsoft.com/office/drawing/2010/main" xmlns="" id="{3678D4C3-489F-4845-97A3-D3EC8FB1390A}"/>
                   </a:ext>
                 </a:extLst>
               </p:cNvPr>
@@ -4857,13 +4736,13 @@
             </p:nvSpPr>
             <p:spPr>
               <a:xfrm>
-                <a:off x="4167433" y="4330913"/>
-                <a:ext cx="806567" cy="461665"/>
+                <a:off x="4167433" y="4280113"/>
+                <a:ext cx="909673" cy="523220"/>
               </a:xfrm>
               <a:prstGeom prst="rect">
                 <a:avLst/>
               </a:prstGeom>
-              <a:blipFill>
+              <a:blipFill rotWithShape="0">
                 <a:blip r:embed="rId7"/>
                 <a:stretch>
                   <a:fillRect/>
@@ -4885,95 +4764,110 @@
           </p:sp>
         </mc:Fallback>
       </mc:AlternateContent>
-      <p:cxnSp>
-        <p:nvCxnSpPr>
-          <p:cNvPr id="80" name="Straight Arrow Connector 79">
-            <a:extLst>
-              <a:ext uri="{FF2B5EF4-FFF2-40B4-BE49-F238E27FC236}">
-                <a16:creationId xmlns:a16="http://schemas.microsoft.com/office/drawing/2014/main" id="{C5E24F6E-5284-8145-971B-2E863874A09C}"/>
-              </a:ext>
-            </a:extLst>
-          </p:cNvPr>
-          <p:cNvCxnSpPr>
-            <a:cxnSpLocks/>
-          </p:cNvCxnSpPr>
+      <p:grpSp>
+        <p:nvGrpSpPr>
+          <p:cNvPr id="19" name="Group 18"/>
+          <p:cNvGrpSpPr/>
           <p:nvPr/>
-        </p:nvCxnSpPr>
-        <p:spPr>
+        </p:nvGrpSpPr>
+        <p:grpSpPr>
           <a:xfrm>
-            <a:off x="3258740" y="2212099"/>
-            <a:ext cx="507299" cy="0"/>
+            <a:off x="3070056" y="1674133"/>
+            <a:ext cx="731520" cy="523220"/>
+            <a:chOff x="3070056" y="1674133"/>
+            <a:chExt cx="731520" cy="523220"/>
           </a:xfrm>
-          <a:prstGeom prst="straightConnector1">
-            <a:avLst/>
-          </a:prstGeom>
-          <a:ln w="19050">
-            <a:solidFill>
-              <a:srgbClr val="9B419F"/>
-            </a:solidFill>
-            <a:prstDash val="sysDash"/>
-            <a:tailEnd type="triangle"/>
-          </a:ln>
-        </p:spPr>
-        <p:style>
-          <a:lnRef idx="1">
-            <a:schemeClr val="accent1"/>
-          </a:lnRef>
-          <a:fillRef idx="0">
-            <a:schemeClr val="accent1"/>
-          </a:fillRef>
-          <a:effectRef idx="0">
-            <a:schemeClr val="accent1"/>
-          </a:effectRef>
-          <a:fontRef idx="minor">
-            <a:schemeClr val="tx1"/>
-          </a:fontRef>
-        </p:style>
-      </p:cxnSp>
-      <p:sp>
-        <p:nvSpPr>
-          <p:cNvPr id="81" name="TextBox 80">
-            <a:extLst>
-              <a:ext uri="{FF2B5EF4-FFF2-40B4-BE49-F238E27FC236}">
-                <a16:creationId xmlns:a16="http://schemas.microsoft.com/office/drawing/2014/main" id="{2FAB4A95-ACD9-2146-B173-37A1985DDA5D}"/>
-              </a:ext>
-            </a:extLst>
-          </p:cNvPr>
-          <p:cNvSpPr txBox="1"/>
-          <p:nvPr/>
-        </p:nvSpPr>
-        <p:spPr>
-          <a:xfrm>
-            <a:off x="3311159" y="1786619"/>
-            <a:ext cx="352982" cy="461665"/>
-          </a:xfrm>
-          <a:prstGeom prst="rect">
-            <a:avLst/>
-          </a:prstGeom>
-          <a:noFill/>
-        </p:spPr>
-        <p:txBody>
-          <a:bodyPr wrap="none" rtlCol="0">
-            <a:spAutoFit/>
-          </a:bodyPr>
-          <a:lstStyle/>
-          <a:p>
-            <a:r>
-              <a:rPr lang="en-US" sz="2400" dirty="0">
-                <a:latin typeface="Cambria Math" panose="02040503050406030204" pitchFamily="18" charset="0"/>
-                <a:ea typeface="Cambria Math" panose="02040503050406030204" pitchFamily="18" charset="0"/>
-              </a:rPr>
-              <a:t>q</a:t>
-            </a:r>
-          </a:p>
-        </p:txBody>
-      </p:sp>
+        </p:grpSpPr>
+        <p:cxnSp>
+          <p:nvCxnSpPr>
+            <p:cNvPr id="80" name="Straight Arrow Connector 79">
+              <a:extLst>
+                <a:ext uri="{FF2B5EF4-FFF2-40B4-BE49-F238E27FC236}">
+                  <a16:creationId xmlns:a16="http://schemas.microsoft.com/office/drawing/2014/main" xmlns="" id="{C5E24F6E-5284-8145-971B-2E863874A09C}"/>
+                </a:ext>
+              </a:extLst>
+            </p:cNvPr>
+            <p:cNvCxnSpPr>
+              <a:cxnSpLocks/>
+            </p:cNvCxnSpPr>
+            <p:nvPr/>
+          </p:nvCxnSpPr>
+          <p:spPr>
+            <a:xfrm>
+              <a:off x="3070056" y="2161299"/>
+              <a:ext cx="731520" cy="0"/>
+            </a:xfrm>
+            <a:prstGeom prst="straightConnector1">
+              <a:avLst/>
+            </a:prstGeom>
+            <a:ln w="25400">
+              <a:solidFill>
+                <a:srgbClr val="9B419F"/>
+              </a:solidFill>
+              <a:prstDash val="solid"/>
+              <a:tailEnd type="triangle"/>
+            </a:ln>
+          </p:spPr>
+          <p:style>
+            <a:lnRef idx="1">
+              <a:schemeClr val="accent1"/>
+            </a:lnRef>
+            <a:fillRef idx="0">
+              <a:schemeClr val="accent1"/>
+            </a:fillRef>
+            <a:effectRef idx="0">
+              <a:schemeClr val="accent1"/>
+            </a:effectRef>
+            <a:fontRef idx="minor">
+              <a:schemeClr val="tx1"/>
+            </a:fontRef>
+          </p:style>
+        </p:cxnSp>
+        <p:sp>
+          <p:nvSpPr>
+            <p:cNvPr id="81" name="TextBox 80">
+              <a:extLst>
+                <a:ext uri="{FF2B5EF4-FFF2-40B4-BE49-F238E27FC236}">
+                  <a16:creationId xmlns:a16="http://schemas.microsoft.com/office/drawing/2014/main" xmlns="" id="{2FAB4A95-ACD9-2146-B173-37A1985DDA5D}"/>
+                </a:ext>
+              </a:extLst>
+            </p:cNvPr>
+            <p:cNvSpPr txBox="1"/>
+            <p:nvPr/>
+          </p:nvSpPr>
+          <p:spPr>
+            <a:xfrm>
+              <a:off x="3311159" y="1674133"/>
+              <a:ext cx="381836" cy="523220"/>
+            </a:xfrm>
+            <a:prstGeom prst="rect">
+              <a:avLst/>
+            </a:prstGeom>
+            <a:noFill/>
+          </p:spPr>
+          <p:txBody>
+            <a:bodyPr wrap="none" rtlCol="0">
+              <a:spAutoFit/>
+            </a:bodyPr>
+            <a:lstStyle/>
+            <a:p>
+              <a:r>
+                <a:rPr lang="en-US" sz="2800" dirty="0">
+                  <a:latin typeface="Cambria Math" panose="02040503050406030204" pitchFamily="18" charset="0"/>
+                  <a:ea typeface="Cambria Math" panose="02040503050406030204" pitchFamily="18" charset="0"/>
+                </a:rPr>
+                <a:t>q</a:t>
+              </a:r>
+            </a:p>
+          </p:txBody>
+        </p:sp>
+      </p:grpSp>
       <p:cxnSp>
         <p:nvCxnSpPr>
           <p:cNvPr id="86" name="Straight Arrow Connector 85">
             <a:extLst>
               <a:ext uri="{FF2B5EF4-FFF2-40B4-BE49-F238E27FC236}">
-                <a16:creationId xmlns:a16="http://schemas.microsoft.com/office/drawing/2014/main" id="{0CA3ACDF-FC4D-B049-85CD-FB2779086680}"/>
+                <a16:creationId xmlns:a16="http://schemas.microsoft.com/office/drawing/2014/main" xmlns="" id="{0CA3ACDF-FC4D-B049-85CD-FB2779086680}"/>
               </a:ext>
             </a:extLst>
           </p:cNvPr>
@@ -4990,7 +4884,7 @@
           <a:prstGeom prst="straightConnector1">
             <a:avLst/>
           </a:prstGeom>
-          <a:ln w="19050">
+          <a:ln w="25400">
             <a:solidFill>
               <a:schemeClr val="accent2">
                 <a:lumMod val="75000"/>
@@ -5021,7 +4915,7 @@
               <p:cNvPr id="90" name="TextBox 89">
                 <a:extLst>
                   <a:ext uri="{FF2B5EF4-FFF2-40B4-BE49-F238E27FC236}">
-                    <a16:creationId xmlns:a16="http://schemas.microsoft.com/office/drawing/2014/main" id="{F2BF27E6-E488-2447-9A0B-0B4284F9B81D}"/>
+                    <a16:creationId xmlns:a16="http://schemas.microsoft.com/office/drawing/2014/main" xmlns="" id="{F2BF27E6-E488-2447-9A0B-0B4284F9B81D}"/>
                   </a:ext>
                 </a:extLst>
               </p:cNvPr>
@@ -5031,7 +4925,7 @@
             <p:spPr>
               <a:xfrm>
                 <a:off x="7666132" y="3818666"/>
-                <a:ext cx="609077" cy="461665"/>
+                <a:ext cx="679738" cy="523220"/>
               </a:xfrm>
               <a:prstGeom prst="rect">
                 <a:avLst/>
@@ -5054,18 +4948,18 @@
                       <m:sSub>
                         <m:sSubPr>
                           <m:ctrlPr>
-                            <a:rPr lang="en-US" sz="2400" b="0" i="1" smtClean="0">
+                            <a:rPr lang="en-US" sz="2800" b="0" i="1" smtClean="0">
                               <a:solidFill>
                                 <a:schemeClr val="tx1"/>
                               </a:solidFill>
-                              <a:latin typeface="Cambria Math" panose="02040503050406030204" pitchFamily="18" charset="0"/>
+                              <a:latin typeface="Cambria Math" charset="0"/>
                               <a:ea typeface="Cambria Math" panose="02040503050406030204" pitchFamily="18" charset="0"/>
                             </a:rPr>
                           </m:ctrlPr>
                         </m:sSubPr>
                         <m:e>
                           <m:r>
-                            <a:rPr lang="en-US" sz="2400" b="0" i="1" smtClean="0">
+                            <a:rPr lang="en-US" sz="2800" b="0" i="1" smtClean="0">
                               <a:solidFill>
                                 <a:schemeClr val="tx1"/>
                               </a:solidFill>
@@ -5077,7 +4971,7 @@
                         </m:e>
                         <m:sub>
                           <m:r>
-                            <a:rPr lang="en-US" sz="2400" b="0" i="1" smtClean="0">
+                            <a:rPr lang="en-US" sz="2800" b="0" i="1" smtClean="0">
                               <a:solidFill>
                                 <a:schemeClr val="tx1"/>
                               </a:solidFill>
@@ -5091,7 +4985,7 @@
                     </m:oMath>
                   </m:oMathPara>
                 </a14:m>
-                <a:endParaRPr lang="en-US" sz="2400" dirty="0">
+                <a:endParaRPr lang="en-US" sz="2800" dirty="0">
                   <a:latin typeface="Cambria Math" panose="02040503050406030204" pitchFamily="18" charset="0"/>
                   <a:ea typeface="Cambria Math" panose="02040503050406030204" pitchFamily="18" charset="0"/>
                 </a:endParaRPr>
@@ -5105,7 +4999,7 @@
               <p:cNvPr id="90" name="TextBox 89">
                 <a:extLst>
                   <a:ext uri="{FF2B5EF4-FFF2-40B4-BE49-F238E27FC236}">
-                    <a16:creationId xmlns:a16="http://schemas.microsoft.com/office/drawing/2014/main" id="{F2BF27E6-E488-2447-9A0B-0B4284F9B81D}"/>
+                    <a16:creationId xmlns:a16="http://schemas.microsoft.com/office/drawing/2014/main" xmlns:a14="http://schemas.microsoft.com/office/drawing/2010/main" xmlns="" id="{F2BF27E6-E488-2447-9A0B-0B4284F9B81D}"/>
                   </a:ext>
                 </a:extLst>
               </p:cNvPr>
@@ -5117,12 +5011,12 @@
             <p:spPr>
               <a:xfrm>
                 <a:off x="7666132" y="3818666"/>
-                <a:ext cx="609077" cy="461665"/>
+                <a:ext cx="679738" cy="523220"/>
               </a:xfrm>
               <a:prstGeom prst="rect">
                 <a:avLst/>
               </a:prstGeom>
-              <a:blipFill>
+              <a:blipFill rotWithShape="0">
                 <a:blip r:embed="rId8"/>
                 <a:stretch>
                   <a:fillRect/>
@@ -5149,7 +5043,7 @@
           <p:cNvPr id="91" name="TextBox 90">
             <a:extLst>
               <a:ext uri="{FF2B5EF4-FFF2-40B4-BE49-F238E27FC236}">
-                <a16:creationId xmlns:a16="http://schemas.microsoft.com/office/drawing/2014/main" id="{283DC57D-236E-7A49-98B2-44248993DABF}"/>
+                <a16:creationId xmlns:a16="http://schemas.microsoft.com/office/drawing/2014/main" xmlns="" id="{283DC57D-236E-7A49-98B2-44248993DABF}"/>
               </a:ext>
             </a:extLst>
           </p:cNvPr>
@@ -5179,6 +5073,236 @@
           </a:p>
         </p:txBody>
       </p:sp>
+      <p:cxnSp>
+        <p:nvCxnSpPr>
+          <p:cNvPr id="12" name="Straight Connector 11"/>
+          <p:cNvCxnSpPr>
+            <a:endCxn id="7" idx="0"/>
+          </p:cNvCxnSpPr>
+          <p:nvPr/>
+        </p:nvCxnSpPr>
+        <p:spPr>
+          <a:xfrm>
+            <a:off x="5644959" y="2742172"/>
+            <a:ext cx="9228" cy="686828"/>
+          </a:xfrm>
+          <a:prstGeom prst="line">
+            <a:avLst/>
+          </a:prstGeom>
+          <a:ln w="25400">
+            <a:solidFill>
+              <a:schemeClr val="accent6">
+                <a:lumMod val="75000"/>
+              </a:schemeClr>
+            </a:solidFill>
+            <a:prstDash val="sysDot"/>
+            <a:tailEnd type="triangle"/>
+          </a:ln>
+        </p:spPr>
+        <p:style>
+          <a:lnRef idx="1">
+            <a:schemeClr val="accent1"/>
+          </a:lnRef>
+          <a:fillRef idx="0">
+            <a:schemeClr val="accent1"/>
+          </a:fillRef>
+          <a:effectRef idx="0">
+            <a:schemeClr val="accent1"/>
+          </a:effectRef>
+          <a:fontRef idx="minor">
+            <a:schemeClr val="tx1"/>
+          </a:fontRef>
+        </p:style>
+      </p:cxnSp>
+      <p:cxnSp>
+        <p:nvCxnSpPr>
+          <p:cNvPr id="45" name="Straight Arrow Connector 44">
+            <a:extLst>
+              <a:ext uri="{FF2B5EF4-FFF2-40B4-BE49-F238E27FC236}">
+                <a16:creationId xmlns:a16="http://schemas.microsoft.com/office/drawing/2014/main" xmlns="" id="{C5E24F6E-5284-8145-971B-2E863874A09C}"/>
+              </a:ext>
+            </a:extLst>
+          </p:cNvPr>
+          <p:cNvCxnSpPr>
+            <a:cxnSpLocks/>
+          </p:cNvCxnSpPr>
+          <p:nvPr/>
+        </p:nvCxnSpPr>
+        <p:spPr>
+          <a:xfrm>
+            <a:off x="1800056" y="3765126"/>
+            <a:ext cx="731520" cy="0"/>
+          </a:xfrm>
+          <a:prstGeom prst="straightConnector1">
+            <a:avLst/>
+          </a:prstGeom>
+          <a:ln w="25400">
+            <a:solidFill>
+              <a:srgbClr val="9B419F"/>
+            </a:solidFill>
+            <a:prstDash val="solid"/>
+            <a:tailEnd type="triangle"/>
+          </a:ln>
+        </p:spPr>
+        <p:style>
+          <a:lnRef idx="1">
+            <a:schemeClr val="accent1"/>
+          </a:lnRef>
+          <a:fillRef idx="0">
+            <a:schemeClr val="accent1"/>
+          </a:fillRef>
+          <a:effectRef idx="0">
+            <a:schemeClr val="accent1"/>
+          </a:effectRef>
+          <a:fontRef idx="minor">
+            <a:schemeClr val="tx1"/>
+          </a:fontRef>
+        </p:style>
+      </p:cxnSp>
+      <p:sp>
+        <p:nvSpPr>
+          <p:cNvPr id="46" name="TextBox 45">
+            <a:extLst>
+              <a:ext uri="{FF2B5EF4-FFF2-40B4-BE49-F238E27FC236}">
+                <a16:creationId xmlns:a16="http://schemas.microsoft.com/office/drawing/2014/main" xmlns="" id="{2FAB4A95-ACD9-2146-B173-37A1985DDA5D}"/>
+              </a:ext>
+            </a:extLst>
+          </p:cNvPr>
+          <p:cNvSpPr txBox="1"/>
+          <p:nvPr/>
+        </p:nvSpPr>
+        <p:spPr>
+          <a:xfrm>
+            <a:off x="1925046" y="3277960"/>
+            <a:ext cx="630301" cy="523220"/>
+          </a:xfrm>
+          <a:prstGeom prst="rect">
+            <a:avLst/>
+          </a:prstGeom>
+          <a:noFill/>
+        </p:spPr>
+        <p:txBody>
+          <a:bodyPr wrap="none" rtlCol="0">
+            <a:spAutoFit/>
+          </a:bodyPr>
+          <a:lstStyle/>
+          <a:p>
+            <a:r>
+              <a:rPr lang="en-US" sz="2800" smtClean="0">
+                <a:latin typeface="Cambria Math" panose="02040503050406030204" pitchFamily="18" charset="0"/>
+                <a:ea typeface="Cambria Math" panose="02040503050406030204" pitchFamily="18" charset="0"/>
+              </a:rPr>
+              <a:t>KB</a:t>
+            </a:r>
+            <a:endParaRPr lang="en-US" sz="2800" dirty="0">
+              <a:latin typeface="Cambria Math" panose="02040503050406030204" pitchFamily="18" charset="0"/>
+              <a:ea typeface="Cambria Math" panose="02040503050406030204" pitchFamily="18" charset="0"/>
+            </a:endParaRPr>
+          </a:p>
+        </p:txBody>
+      </p:sp>
+      <p:grpSp>
+        <p:nvGrpSpPr>
+          <p:cNvPr id="47" name="Group 46"/>
+          <p:cNvGrpSpPr/>
+          <p:nvPr/>
+        </p:nvGrpSpPr>
+        <p:grpSpPr>
+          <a:xfrm>
+            <a:off x="3048287" y="2116818"/>
+            <a:ext cx="774702" cy="523220"/>
+            <a:chOff x="3070056" y="1717675"/>
+            <a:chExt cx="774702" cy="523220"/>
+          </a:xfrm>
+        </p:grpSpPr>
+        <p:cxnSp>
+          <p:nvCxnSpPr>
+            <p:cNvPr id="48" name="Straight Arrow Connector 47">
+              <a:extLst>
+                <a:ext uri="{FF2B5EF4-FFF2-40B4-BE49-F238E27FC236}">
+                  <a16:creationId xmlns:a16="http://schemas.microsoft.com/office/drawing/2014/main" xmlns="" id="{C5E24F6E-5284-8145-971B-2E863874A09C}"/>
+                </a:ext>
+              </a:extLst>
+            </p:cNvPr>
+            <p:cNvCxnSpPr>
+              <a:cxnSpLocks/>
+            </p:cNvCxnSpPr>
+            <p:nvPr/>
+          </p:nvCxnSpPr>
+          <p:spPr>
+            <a:xfrm>
+              <a:off x="3070056" y="2161299"/>
+              <a:ext cx="731520" cy="0"/>
+            </a:xfrm>
+            <a:prstGeom prst="straightConnector1">
+              <a:avLst/>
+            </a:prstGeom>
+            <a:ln w="25400">
+              <a:solidFill>
+                <a:srgbClr val="9B419F"/>
+              </a:solidFill>
+              <a:prstDash val="solid"/>
+              <a:tailEnd type="triangle"/>
+            </a:ln>
+          </p:spPr>
+          <p:style>
+            <a:lnRef idx="1">
+              <a:schemeClr val="accent1"/>
+            </a:lnRef>
+            <a:fillRef idx="0">
+              <a:schemeClr val="accent1"/>
+            </a:fillRef>
+            <a:effectRef idx="0">
+              <a:schemeClr val="accent1"/>
+            </a:effectRef>
+            <a:fontRef idx="minor">
+              <a:schemeClr val="tx1"/>
+            </a:fontRef>
+          </p:style>
+        </p:cxnSp>
+        <p:sp>
+          <p:nvSpPr>
+            <p:cNvPr id="49" name="TextBox 48">
+              <a:extLst>
+                <a:ext uri="{FF2B5EF4-FFF2-40B4-BE49-F238E27FC236}">
+                  <a16:creationId xmlns:a16="http://schemas.microsoft.com/office/drawing/2014/main" xmlns="" id="{2FAB4A95-ACD9-2146-B173-37A1985DDA5D}"/>
+                </a:ext>
+              </a:extLst>
+            </p:cNvPr>
+            <p:cNvSpPr txBox="1"/>
+            <p:nvPr/>
+          </p:nvSpPr>
+          <p:spPr>
+            <a:xfrm>
+              <a:off x="3224075" y="1717675"/>
+              <a:ext cx="620683" cy="523220"/>
+            </a:xfrm>
+            <a:prstGeom prst="rect">
+              <a:avLst/>
+            </a:prstGeom>
+            <a:noFill/>
+          </p:spPr>
+          <p:txBody>
+            <a:bodyPr wrap="none" rtlCol="0">
+              <a:spAutoFit/>
+            </a:bodyPr>
+            <a:lstStyle/>
+            <a:p>
+              <a:r>
+                <a:rPr lang="en-US" sz="2800" smtClean="0">
+                  <a:latin typeface="Cambria Math" panose="02040503050406030204" pitchFamily="18" charset="0"/>
+                  <a:ea typeface="Cambria Math" panose="02040503050406030204" pitchFamily="18" charset="0"/>
+                </a:rPr>
+                <a:t>cw</a:t>
+              </a:r>
+              <a:endParaRPr lang="en-US" sz="2800" dirty="0">
+                <a:latin typeface="Cambria Math" panose="02040503050406030204" pitchFamily="18" charset="0"/>
+                <a:ea typeface="Cambria Math" panose="02040503050406030204" pitchFamily="18" charset="0"/>
+              </a:endParaRPr>
+            </a:p>
+          </p:txBody>
+        </p:sp>
+      </p:grpSp>
     </p:spTree>
     <p:extLst>
       <p:ext uri="{BB962C8B-B14F-4D97-AF65-F5344CB8AC3E}">

</xml_diff>

<commit_message>
Changed mac cell figure
</commit_message>
<xml_diff>
--- a/2018_nips_vigil/img/mac_cell.pptx
+++ b/2018_nips_vigil/img/mac_cell.pptx
@@ -4823,44 +4823,105 @@
             </a:fontRef>
           </p:style>
         </p:cxnSp>
-        <p:sp>
-          <p:nvSpPr>
-            <p:cNvPr id="81" name="TextBox 80">
-              <a:extLst>
-                <a:ext uri="{FF2B5EF4-FFF2-40B4-BE49-F238E27FC236}">
-                  <a16:creationId xmlns:a16="http://schemas.microsoft.com/office/drawing/2014/main" xmlns="" id="{2FAB4A95-ACD9-2146-B173-37A1985DDA5D}"/>
-                </a:ext>
-              </a:extLst>
-            </p:cNvPr>
-            <p:cNvSpPr txBox="1"/>
-            <p:nvPr/>
-          </p:nvSpPr>
-          <p:spPr>
-            <a:xfrm>
-              <a:off x="3311159" y="1674133"/>
-              <a:ext cx="381836" cy="523220"/>
-            </a:xfrm>
-            <a:prstGeom prst="rect">
-              <a:avLst/>
-            </a:prstGeom>
-            <a:noFill/>
-          </p:spPr>
-          <p:txBody>
-            <a:bodyPr wrap="none" rtlCol="0">
-              <a:spAutoFit/>
-            </a:bodyPr>
-            <a:lstStyle/>
-            <a:p>
-              <a:r>
-                <a:rPr lang="en-US" sz="2800" dirty="0">
-                  <a:latin typeface="Cambria Math" panose="02040503050406030204" pitchFamily="18" charset="0"/>
-                  <a:ea typeface="Cambria Math" panose="02040503050406030204" pitchFamily="18" charset="0"/>
-                </a:rPr>
-                <a:t>q</a:t>
-              </a:r>
-            </a:p>
-          </p:txBody>
-        </p:sp>
+        <mc:AlternateContent xmlns:mc="http://schemas.openxmlformats.org/markup-compatibility/2006">
+          <mc:Choice xmlns:a14="http://schemas.microsoft.com/office/drawing/2010/main" Requires="a14">
+            <p:sp>
+              <p:nvSpPr>
+                <p:cNvPr id="81" name="TextBox 80">
+                  <a:extLst>
+                    <a:ext uri="{FF2B5EF4-FFF2-40B4-BE49-F238E27FC236}">
+                      <a16:creationId xmlns:a16="http://schemas.microsoft.com/office/drawing/2014/main" xmlns="" id="{2FAB4A95-ACD9-2146-B173-37A1985DDA5D}"/>
+                    </a:ext>
+                  </a:extLst>
+                </p:cNvPr>
+                <p:cNvSpPr txBox="1"/>
+                <p:nvPr/>
+              </p:nvSpPr>
+              <p:spPr>
+                <a:xfrm>
+                  <a:off x="3311159" y="1674133"/>
+                  <a:ext cx="468077" cy="523220"/>
+                </a:xfrm>
+                <a:prstGeom prst="rect">
+                  <a:avLst/>
+                </a:prstGeom>
+                <a:noFill/>
+              </p:spPr>
+              <p:txBody>
+                <a:bodyPr wrap="none" rtlCol="0">
+                  <a:spAutoFit/>
+                </a:bodyPr>
+                <a:lstStyle/>
+                <a:p>
+                  <a14:m>
+                    <m:oMathPara xmlns:m="http://schemas.openxmlformats.org/officeDocument/2006/math">
+                      <m:oMathParaPr>
+                        <m:jc m:val="centerGroup"/>
+                      </m:oMathParaPr>
+                      <m:oMath xmlns:m="http://schemas.openxmlformats.org/officeDocument/2006/math">
+                        <m:r>
+                          <a:rPr lang="en-US" sz="2800" b="0" i="1" smtClean="0">
+                            <a:latin typeface="Cambria Math" charset="0"/>
+                            <a:ea typeface="Cambria Math" panose="02040503050406030204" pitchFamily="18" charset="0"/>
+                          </a:rPr>
+                          <m:t>𝑞</m:t>
+                        </m:r>
+                      </m:oMath>
+                    </m:oMathPara>
+                  </a14:m>
+                  <a:endParaRPr lang="en-US" sz="2800" dirty="0">
+                    <a:latin typeface="Cambria Math" panose="02040503050406030204" pitchFamily="18" charset="0"/>
+                    <a:ea typeface="Cambria Math" panose="02040503050406030204" pitchFamily="18" charset="0"/>
+                  </a:endParaRPr>
+                </a:p>
+              </p:txBody>
+            </p:sp>
+          </mc:Choice>
+          <mc:Fallback>
+            <p:sp>
+              <p:nvSpPr>
+                <p:cNvPr id="81" name="TextBox 80">
+                  <a:extLst>
+                    <a:ext uri="{FF2B5EF4-FFF2-40B4-BE49-F238E27FC236}">
+                      <a16:creationId xmlns:a16="http://schemas.microsoft.com/office/drawing/2014/main" xmlns="" id="{2FAB4A95-ACD9-2146-B173-37A1985DDA5D}"/>
+                    </a:ext>
+                  </a:extLst>
+                </p:cNvPr>
+                <p:cNvSpPr txBox="1">
+                  <a:spLocks noRot="1" noChangeAspect="1" noMove="1" noResize="1" noEditPoints="1" noAdjustHandles="1" noChangeArrowheads="1" noChangeShapeType="1" noTextEdit="1"/>
+                </p:cNvSpPr>
+                <p:nvPr/>
+              </p:nvSpPr>
+              <p:spPr>
+                <a:xfrm>
+                  <a:off x="3311159" y="1674133"/>
+                  <a:ext cx="468077" cy="523220"/>
+                </a:xfrm>
+                <a:prstGeom prst="rect">
+                  <a:avLst/>
+                </a:prstGeom>
+                <a:blipFill rotWithShape="0">
+                  <a:blip r:embed="rId8"/>
+                  <a:stretch>
+                    <a:fillRect/>
+                  </a:stretch>
+                </a:blipFill>
+              </p:spPr>
+              <p:txBody>
+                <a:bodyPr/>
+                <a:lstStyle/>
+                <a:p>
+                  <a:r>
+                    <a:rPr lang="en-US">
+                      <a:noFill/>
+                    </a:rPr>
+                    <a:t> </a:t>
+                  </a:r>
+                </a:p>
+              </p:txBody>
+            </p:sp>
+          </mc:Fallback>
+        </mc:AlternateContent>
       </p:grpSp>
       <p:cxnSp>
         <p:nvCxnSpPr>
@@ -5017,7 +5078,7 @@
                 <a:avLst/>
               </a:prstGeom>
               <a:blipFill rotWithShape="0">
-                <a:blip r:embed="rId8"/>
+                <a:blip r:embed="rId9"/>
                 <a:stretch>
                   <a:fillRect/>
                 </a:stretch>
@@ -5159,150 +5220,249 @@
           </a:fontRef>
         </p:style>
       </p:cxnSp>
-      <p:sp>
-        <p:nvSpPr>
-          <p:cNvPr id="46" name="TextBox 45">
-            <a:extLst>
-              <a:ext uri="{FF2B5EF4-FFF2-40B4-BE49-F238E27FC236}">
-                <a16:creationId xmlns:a16="http://schemas.microsoft.com/office/drawing/2014/main" xmlns="" id="{2FAB4A95-ACD9-2146-B173-37A1985DDA5D}"/>
-              </a:ext>
-            </a:extLst>
-          </p:cNvPr>
-          <p:cNvSpPr txBox="1"/>
+      <mc:AlternateContent xmlns:mc="http://schemas.openxmlformats.org/markup-compatibility/2006">
+        <mc:Choice xmlns:a14="http://schemas.microsoft.com/office/drawing/2010/main" Requires="a14">
+          <p:sp>
+            <p:nvSpPr>
+              <p:cNvPr id="46" name="TextBox 45">
+                <a:extLst>
+                  <a:ext uri="{FF2B5EF4-FFF2-40B4-BE49-F238E27FC236}">
+                    <a16:creationId xmlns:a16="http://schemas.microsoft.com/office/drawing/2014/main" xmlns="" id="{2FAB4A95-ACD9-2146-B173-37A1985DDA5D}"/>
+                  </a:ext>
+                </a:extLst>
+              </p:cNvPr>
+              <p:cNvSpPr txBox="1"/>
+              <p:nvPr/>
+            </p:nvSpPr>
+            <p:spPr>
+              <a:xfrm>
+                <a:off x="2039346" y="3328760"/>
+                <a:ext cx="481222" cy="523220"/>
+              </a:xfrm>
+              <a:prstGeom prst="rect">
+                <a:avLst/>
+              </a:prstGeom>
+              <a:noFill/>
+            </p:spPr>
+            <p:txBody>
+              <a:bodyPr wrap="none" rtlCol="0">
+                <a:spAutoFit/>
+              </a:bodyPr>
+              <a:lstStyle/>
+              <a:p>
+                <a14:m>
+                  <m:oMathPara xmlns:m="http://schemas.openxmlformats.org/officeDocument/2006/math">
+                    <m:oMathParaPr>
+                      <m:jc m:val="centerGroup"/>
+                    </m:oMathParaPr>
+                    <m:oMath xmlns:m="http://schemas.openxmlformats.org/officeDocument/2006/math">
+                      <m:r>
+                        <a:rPr lang="en-US" sz="2800" b="1" i="0" smtClean="0">
+                          <a:latin typeface="Cambria Math" charset="0"/>
+                          <a:ea typeface="Cambria Math" panose="02040503050406030204" pitchFamily="18" charset="0"/>
+                        </a:rPr>
+                        <m:t>𝐤</m:t>
+                      </m:r>
+                    </m:oMath>
+                  </m:oMathPara>
+                </a14:m>
+                <a:endParaRPr lang="en-US" sz="2800" b="1" dirty="0">
+                  <a:latin typeface="Cambria Math" panose="02040503050406030204" pitchFamily="18" charset="0"/>
+                  <a:ea typeface="Cambria Math" panose="02040503050406030204" pitchFamily="18" charset="0"/>
+                </a:endParaRPr>
+              </a:p>
+            </p:txBody>
+          </p:sp>
+        </mc:Choice>
+        <mc:Fallback>
+          <p:sp>
+            <p:nvSpPr>
+              <p:cNvPr id="46" name="TextBox 45">
+                <a:extLst>
+                  <a:ext uri="{FF2B5EF4-FFF2-40B4-BE49-F238E27FC236}">
+                    <a16:creationId xmlns:a16="http://schemas.microsoft.com/office/drawing/2014/main" xmlns="" id="{2FAB4A95-ACD9-2146-B173-37A1985DDA5D}"/>
+                  </a:ext>
+                </a:extLst>
+              </p:cNvPr>
+              <p:cNvSpPr txBox="1">
+                <a:spLocks noRot="1" noChangeAspect="1" noMove="1" noResize="1" noEditPoints="1" noAdjustHandles="1" noChangeArrowheads="1" noChangeShapeType="1" noTextEdit="1"/>
+              </p:cNvSpPr>
+              <p:nvPr/>
+            </p:nvSpPr>
+            <p:spPr>
+              <a:xfrm>
+                <a:off x="2039346" y="3328760"/>
+                <a:ext cx="481222" cy="523220"/>
+              </a:xfrm>
+              <a:prstGeom prst="rect">
+                <a:avLst/>
+              </a:prstGeom>
+              <a:blipFill rotWithShape="0">
+                <a:blip r:embed="rId10"/>
+                <a:stretch>
+                  <a:fillRect/>
+                </a:stretch>
+              </a:blipFill>
+            </p:spPr>
+            <p:txBody>
+              <a:bodyPr/>
+              <a:lstStyle/>
+              <a:p>
+                <a:r>
+                  <a:rPr lang="en-US">
+                    <a:noFill/>
+                  </a:rPr>
+                  <a:t> </a:t>
+                </a:r>
+              </a:p>
+            </p:txBody>
+          </p:sp>
+        </mc:Fallback>
+      </mc:AlternateContent>
+      <p:cxnSp>
+        <p:nvCxnSpPr>
+          <p:cNvPr id="48" name="Straight Arrow Connector 47">
+            <a:extLst>
+              <a:ext uri="{FF2B5EF4-FFF2-40B4-BE49-F238E27FC236}">
+                <a16:creationId xmlns:a16="http://schemas.microsoft.com/office/drawing/2014/main" xmlns="" id="{C5E24F6E-5284-8145-971B-2E863874A09C}"/>
+              </a:ext>
+            </a:extLst>
+          </p:cNvPr>
+          <p:cNvCxnSpPr>
+            <a:cxnSpLocks/>
+          </p:cNvCxnSpPr>
           <p:nvPr/>
-        </p:nvSpPr>
+        </p:nvCxnSpPr>
         <p:spPr>
           <a:xfrm>
-            <a:off x="1925046" y="3277960"/>
-            <a:ext cx="630301" cy="523220"/>
+            <a:off x="3048287" y="2560442"/>
+            <a:ext cx="731520" cy="0"/>
           </a:xfrm>
-          <a:prstGeom prst="rect">
+          <a:prstGeom prst="straightConnector1">
             <a:avLst/>
           </a:prstGeom>
-          <a:noFill/>
+          <a:ln w="25400">
+            <a:solidFill>
+              <a:srgbClr val="9B419F"/>
+            </a:solidFill>
+            <a:prstDash val="solid"/>
+            <a:tailEnd type="triangle"/>
+          </a:ln>
         </p:spPr>
-        <p:txBody>
-          <a:bodyPr wrap="none" rtlCol="0">
-            <a:spAutoFit/>
-          </a:bodyPr>
-          <a:lstStyle/>
-          <a:p>
-            <a:r>
-              <a:rPr lang="en-US" sz="2800" smtClean="0">
-                <a:latin typeface="Cambria Math" panose="02040503050406030204" pitchFamily="18" charset="0"/>
-                <a:ea typeface="Cambria Math" panose="02040503050406030204" pitchFamily="18" charset="0"/>
-              </a:rPr>
-              <a:t>KB</a:t>
-            </a:r>
-            <a:endParaRPr lang="en-US" sz="2800" dirty="0">
-              <a:latin typeface="Cambria Math" panose="02040503050406030204" pitchFamily="18" charset="0"/>
-              <a:ea typeface="Cambria Math" panose="02040503050406030204" pitchFamily="18" charset="0"/>
-            </a:endParaRPr>
-          </a:p>
-        </p:txBody>
-      </p:sp>
-      <p:grpSp>
-        <p:nvGrpSpPr>
-          <p:cNvPr id="47" name="Group 46"/>
-          <p:cNvGrpSpPr/>
-          <p:nvPr/>
-        </p:nvGrpSpPr>
-        <p:grpSpPr>
-          <a:xfrm>
-            <a:off x="3048287" y="2116818"/>
-            <a:ext cx="774702" cy="523220"/>
-            <a:chOff x="3070056" y="1717675"/>
-            <a:chExt cx="774702" cy="523220"/>
-          </a:xfrm>
-        </p:grpSpPr>
-        <p:cxnSp>
-          <p:nvCxnSpPr>
-            <p:cNvPr id="48" name="Straight Arrow Connector 47">
-              <a:extLst>
-                <a:ext uri="{FF2B5EF4-FFF2-40B4-BE49-F238E27FC236}">
-                  <a16:creationId xmlns:a16="http://schemas.microsoft.com/office/drawing/2014/main" xmlns="" id="{C5E24F6E-5284-8145-971B-2E863874A09C}"/>
-                </a:ext>
-              </a:extLst>
-            </p:cNvPr>
-            <p:cNvCxnSpPr>
-              <a:cxnSpLocks/>
-            </p:cNvCxnSpPr>
-            <p:nvPr/>
-          </p:nvCxnSpPr>
-          <p:spPr>
-            <a:xfrm>
-              <a:off x="3070056" y="2161299"/>
-              <a:ext cx="731520" cy="0"/>
-            </a:xfrm>
-            <a:prstGeom prst="straightConnector1">
-              <a:avLst/>
-            </a:prstGeom>
-            <a:ln w="25400">
-              <a:solidFill>
-                <a:srgbClr val="9B419F"/>
-              </a:solidFill>
-              <a:prstDash val="solid"/>
-              <a:tailEnd type="triangle"/>
-            </a:ln>
-          </p:spPr>
-          <p:style>
-            <a:lnRef idx="1">
-              <a:schemeClr val="accent1"/>
-            </a:lnRef>
-            <a:fillRef idx="0">
-              <a:schemeClr val="accent1"/>
-            </a:fillRef>
-            <a:effectRef idx="0">
-              <a:schemeClr val="accent1"/>
-            </a:effectRef>
-            <a:fontRef idx="minor">
-              <a:schemeClr val="tx1"/>
-            </a:fontRef>
-          </p:style>
-        </p:cxnSp>
-        <p:sp>
-          <p:nvSpPr>
-            <p:cNvPr id="49" name="TextBox 48">
-              <a:extLst>
-                <a:ext uri="{FF2B5EF4-FFF2-40B4-BE49-F238E27FC236}">
-                  <a16:creationId xmlns:a16="http://schemas.microsoft.com/office/drawing/2014/main" xmlns="" id="{2FAB4A95-ACD9-2146-B173-37A1985DDA5D}"/>
-                </a:ext>
-              </a:extLst>
-            </p:cNvPr>
-            <p:cNvSpPr txBox="1"/>
-            <p:nvPr/>
-          </p:nvSpPr>
-          <p:spPr>
-            <a:xfrm>
-              <a:off x="3224075" y="1717675"/>
-              <a:ext cx="620683" cy="523220"/>
-            </a:xfrm>
-            <a:prstGeom prst="rect">
-              <a:avLst/>
-            </a:prstGeom>
-            <a:noFill/>
-          </p:spPr>
-          <p:txBody>
-            <a:bodyPr wrap="none" rtlCol="0">
-              <a:spAutoFit/>
-            </a:bodyPr>
-            <a:lstStyle/>
-            <a:p>
-              <a:r>
-                <a:rPr lang="en-US" sz="2800" smtClean="0">
+        <p:style>
+          <a:lnRef idx="1">
+            <a:schemeClr val="accent1"/>
+          </a:lnRef>
+          <a:fillRef idx="0">
+            <a:schemeClr val="accent1"/>
+          </a:fillRef>
+          <a:effectRef idx="0">
+            <a:schemeClr val="accent1"/>
+          </a:effectRef>
+          <a:fontRef idx="minor">
+            <a:schemeClr val="tx1"/>
+          </a:fontRef>
+        </p:style>
+      </p:cxnSp>
+      <mc:AlternateContent xmlns:mc="http://schemas.openxmlformats.org/markup-compatibility/2006">
+        <mc:Choice xmlns:a14="http://schemas.microsoft.com/office/drawing/2010/main" Requires="a14">
+          <p:sp>
+            <p:nvSpPr>
+              <p:cNvPr id="49" name="TextBox 48">
+                <a:extLst>
+                  <a:ext uri="{FF2B5EF4-FFF2-40B4-BE49-F238E27FC236}">
+                    <a16:creationId xmlns:a16="http://schemas.microsoft.com/office/drawing/2014/main" xmlns="" id="{2FAB4A95-ACD9-2146-B173-37A1985DDA5D}"/>
+                  </a:ext>
+                </a:extLst>
+              </p:cNvPr>
+              <p:cNvSpPr txBox="1"/>
+              <p:nvPr/>
+            </p:nvSpPr>
+            <p:spPr>
+              <a:xfrm>
+                <a:off x="3113406" y="2142218"/>
+                <a:ext cx="726481" cy="523220"/>
+              </a:xfrm>
+              <a:prstGeom prst="rect">
+                <a:avLst/>
+              </a:prstGeom>
+              <a:noFill/>
+            </p:spPr>
+            <p:txBody>
+              <a:bodyPr wrap="none" rtlCol="0">
+                <a:spAutoFit/>
+              </a:bodyPr>
+              <a:lstStyle/>
+              <a:p>
+                <a14:m>
+                  <m:oMathPara xmlns:m="http://schemas.openxmlformats.org/officeDocument/2006/math">
+                    <m:oMathParaPr>
+                      <m:jc m:val="centerGroup"/>
+                    </m:oMathParaPr>
+                    <m:oMath xmlns:m="http://schemas.openxmlformats.org/officeDocument/2006/math">
+                      <m:r>
+                        <a:rPr lang="en-US" sz="2800" b="1" i="0" smtClean="0">
+                          <a:latin typeface="Cambria Math" charset="0"/>
+                          <a:ea typeface="Cambria Math" panose="02040503050406030204" pitchFamily="18" charset="0"/>
+                        </a:rPr>
+                        <m:t>𝐜𝐰</m:t>
+                      </m:r>
+                    </m:oMath>
+                  </m:oMathPara>
+                </a14:m>
+                <a:endParaRPr lang="en-US" sz="2800" b="1" dirty="0">
                   <a:latin typeface="Cambria Math" panose="02040503050406030204" pitchFamily="18" charset="0"/>
                   <a:ea typeface="Cambria Math" panose="02040503050406030204" pitchFamily="18" charset="0"/>
-                </a:rPr>
-                <a:t>cw</a:t>
-              </a:r>
-              <a:endParaRPr lang="en-US" sz="2800" dirty="0">
-                <a:latin typeface="Cambria Math" panose="02040503050406030204" pitchFamily="18" charset="0"/>
-                <a:ea typeface="Cambria Math" panose="02040503050406030204" pitchFamily="18" charset="0"/>
-              </a:endParaRPr>
-            </a:p>
-          </p:txBody>
-        </p:sp>
-      </p:grpSp>
+                </a:endParaRPr>
+              </a:p>
+            </p:txBody>
+          </p:sp>
+        </mc:Choice>
+        <mc:Fallback>
+          <p:sp>
+            <p:nvSpPr>
+              <p:cNvPr id="49" name="TextBox 48">
+                <a:extLst>
+                  <a:ext uri="{FF2B5EF4-FFF2-40B4-BE49-F238E27FC236}">
+                    <a16:creationId xmlns:a16="http://schemas.microsoft.com/office/drawing/2014/main" xmlns="" id="{2FAB4A95-ACD9-2146-B173-37A1985DDA5D}"/>
+                  </a:ext>
+                </a:extLst>
+              </p:cNvPr>
+              <p:cNvSpPr txBox="1">
+                <a:spLocks noRot="1" noChangeAspect="1" noMove="1" noResize="1" noEditPoints="1" noAdjustHandles="1" noChangeArrowheads="1" noChangeShapeType="1" noTextEdit="1"/>
+              </p:cNvSpPr>
+              <p:nvPr/>
+            </p:nvSpPr>
+            <p:spPr>
+              <a:xfrm>
+                <a:off x="3113406" y="2142218"/>
+                <a:ext cx="726481" cy="523220"/>
+              </a:xfrm>
+              <a:prstGeom prst="rect">
+                <a:avLst/>
+              </a:prstGeom>
+              <a:blipFill rotWithShape="0">
+                <a:blip r:embed="rId11"/>
+                <a:stretch>
+                  <a:fillRect/>
+                </a:stretch>
+              </a:blipFill>
+            </p:spPr>
+            <p:txBody>
+              <a:bodyPr/>
+              <a:lstStyle/>
+              <a:p>
+                <a:r>
+                  <a:rPr lang="en-US">
+                    <a:noFill/>
+                  </a:rPr>
+                  <a:t> </a:t>
+                </a:r>
+              </a:p>
+            </p:txBody>
+          </p:sp>
+        </mc:Fallback>
+      </mc:AlternateContent>
     </p:spTree>
     <p:extLst>
       <p:ext uri="{BB962C8B-B14F-4D97-AF65-F5344CB8AC3E}">

</xml_diff>